<commit_message>
Fixed typos for 2019
</commit_message>
<xml_diff>
--- a/explanation.pptx
+++ b/explanation.pptx
@@ -112,522 +112,42 @@
       </a:defRPr>
     </a:lvl9pPr>
   </p:defaultTextStyle>
+  <p:extLst>
+    <p:ext uri="{EFAFB233-063F-42B5-8137-9DF3F51BA10A}">
+      <p15:sldGuideLst xmlns:p15="http://schemas.microsoft.com/office/powerpoint/2012/main"/>
+    </p:ext>
+  </p:extLst>
 </p:presentation>
 </file>
 
 <file path=ppt/changesInfos/changesInfo1.xml><?xml version="1.0" encoding="utf-8"?>
 <pc:chgInfo xmlns:a="http://schemas.openxmlformats.org/drawingml/2006/main" xmlns:r="http://schemas.openxmlformats.org/officeDocument/2006/relationships" xmlns:ac="http://schemas.microsoft.com/office/drawing/2013/main/command" xmlns:pc="http://schemas.microsoft.com/office/powerpoint/2013/main/command">
   <pc:docChgLst>
-    <pc:chgData name="Conrad Bessant" userId="d4e3a46bc100e212" providerId="LiveId" clId="{15D4631F-D760-4ADF-939B-954E88C3F303}"/>
-    <pc:docChg chg="undo custSel addSld modSld">
-      <pc:chgData name="Conrad Bessant" userId="d4e3a46bc100e212" providerId="LiveId" clId="{15D4631F-D760-4ADF-939B-954E88C3F303}" dt="2018-01-15T13:31:34.064" v="1549" actId="6549"/>
+    <pc:chgData name="Conrad Bessant" userId="d4e3a46bc100e212" providerId="LiveId" clId="{4D90BB7C-8E2F-41F3-8217-EAAEC5D501B3}"/>
+    <pc:docChg chg="modSld">
+      <pc:chgData name="Conrad Bessant" userId="d4e3a46bc100e212" providerId="LiveId" clId="{4D90BB7C-8E2F-41F3-8217-EAAEC5D501B3}" dt="2018-12-18T10:52:52.681" v="1" actId="20577"/>
       <pc:docMkLst>
         <pc:docMk/>
       </pc:docMkLst>
       <pc:sldChg chg="modSp">
-        <pc:chgData name="Conrad Bessant" userId="d4e3a46bc100e212" providerId="LiveId" clId="{15D4631F-D760-4ADF-939B-954E88C3F303}" dt="2018-01-15T11:21:53.737" v="168" actId="20577"/>
-        <pc:sldMkLst>
-          <pc:docMk/>
-          <pc:sldMk cId="2777446783" sldId="256"/>
-        </pc:sldMkLst>
-        <pc:spChg chg="mod">
-          <ac:chgData name="Conrad Bessant" userId="d4e3a46bc100e212" providerId="LiveId" clId="{15D4631F-D760-4ADF-939B-954E88C3F303}" dt="2018-01-15T11:21:31.236" v="76" actId="20577"/>
-          <ac:spMkLst>
-            <pc:docMk/>
-            <pc:sldMk cId="2777446783" sldId="256"/>
-            <ac:spMk id="2" creationId="{B18DBF75-0C02-4AD2-AA46-BBBCEECDF36A}"/>
-          </ac:spMkLst>
-        </pc:spChg>
-        <pc:spChg chg="mod">
-          <ac:chgData name="Conrad Bessant" userId="d4e3a46bc100e212" providerId="LiveId" clId="{15D4631F-D760-4ADF-939B-954E88C3F303}" dt="2018-01-15T11:21:53.737" v="168" actId="20577"/>
-          <ac:spMkLst>
-            <pc:docMk/>
-            <pc:sldMk cId="2777446783" sldId="256"/>
-            <ac:spMk id="3" creationId="{23A0DEA6-D15E-4029-AD58-A2BCF32425D3}"/>
-          </ac:spMkLst>
-        </pc:spChg>
-      </pc:sldChg>
-      <pc:sldChg chg="addSp delSp modSp">
-        <pc:chgData name="Conrad Bessant" userId="d4e3a46bc100e212" providerId="LiveId" clId="{15D4631F-D760-4ADF-939B-954E88C3F303}" dt="2018-01-15T13:28:28.907" v="1407" actId="1036"/>
-        <pc:sldMkLst>
-          <pc:docMk/>
-          <pc:sldMk cId="3668064913" sldId="257"/>
-        </pc:sldMkLst>
-        <pc:spChg chg="mod">
-          <ac:chgData name="Conrad Bessant" userId="d4e3a46bc100e212" providerId="LiveId" clId="{15D4631F-D760-4ADF-939B-954E88C3F303}" dt="2018-01-15T13:28:28.907" v="1407" actId="1036"/>
-          <ac:spMkLst>
-            <pc:docMk/>
-            <pc:sldMk cId="3668064913" sldId="257"/>
-            <ac:spMk id="2" creationId="{37ED8E29-5C26-4256-9E62-D456FF183713}"/>
-          </ac:spMkLst>
-        </pc:spChg>
-        <pc:spChg chg="mod">
-          <ac:chgData name="Conrad Bessant" userId="d4e3a46bc100e212" providerId="LiveId" clId="{15D4631F-D760-4ADF-939B-954E88C3F303}" dt="2018-01-15T11:23:12.698" v="269" actId="2711"/>
-          <ac:spMkLst>
-            <pc:docMk/>
-            <pc:sldMk cId="3668064913" sldId="257"/>
-            <ac:spMk id="12" creationId="{3ECF89B8-ED65-46D8-A34B-993B9E77DDB4}"/>
-          </ac:spMkLst>
-        </pc:spChg>
-        <pc:spChg chg="add mod">
-          <ac:chgData name="Conrad Bessant" userId="d4e3a46bc100e212" providerId="LiveId" clId="{15D4631F-D760-4ADF-939B-954E88C3F303}" dt="2018-01-15T13:26:48.319" v="1387" actId="1076"/>
-          <ac:spMkLst>
-            <pc:docMk/>
-            <pc:sldMk cId="3668064913" sldId="257"/>
-            <ac:spMk id="19" creationId="{9BB84B3B-7EC2-45EA-9C5E-90510918D4B8}"/>
-          </ac:spMkLst>
-        </pc:spChg>
-        <pc:spChg chg="add mod">
-          <ac:chgData name="Conrad Bessant" userId="d4e3a46bc100e212" providerId="LiveId" clId="{15D4631F-D760-4ADF-939B-954E88C3F303}" dt="2018-01-15T13:27:42.425" v="1403" actId="1076"/>
-          <ac:spMkLst>
-            <pc:docMk/>
-            <pc:sldMk cId="3668064913" sldId="257"/>
-            <ac:spMk id="27" creationId="{7F364ED2-3F9F-47F9-BF36-24BCA338B6CE}"/>
-          </ac:spMkLst>
-        </pc:spChg>
-        <pc:cxnChg chg="add mod">
-          <ac:chgData name="Conrad Bessant" userId="d4e3a46bc100e212" providerId="LiveId" clId="{15D4631F-D760-4ADF-939B-954E88C3F303}" dt="2018-01-15T13:27:27.895" v="1397" actId="692"/>
-          <ac:cxnSpMkLst>
-            <pc:docMk/>
-            <pc:sldMk cId="3668064913" sldId="257"/>
-            <ac:cxnSpMk id="21" creationId="{E5BF030F-F8E5-41E0-9975-9302C61D5C1E}"/>
-          </ac:cxnSpMkLst>
-        </pc:cxnChg>
-        <pc:cxnChg chg="add del mod">
-          <ac:chgData name="Conrad Bessant" userId="d4e3a46bc100e212" providerId="LiveId" clId="{15D4631F-D760-4ADF-939B-954E88C3F303}" dt="2018-01-15T13:27:20.397" v="1394" actId="478"/>
-          <ac:cxnSpMkLst>
-            <pc:docMk/>
-            <pc:sldMk cId="3668064913" sldId="257"/>
-            <ac:cxnSpMk id="22" creationId="{6CEBA56B-2CF0-49DC-A64E-1C9365C83C0B}"/>
-          </ac:cxnSpMkLst>
-        </pc:cxnChg>
-      </pc:sldChg>
-      <pc:sldChg chg="modSp">
-        <pc:chgData name="Conrad Bessant" userId="d4e3a46bc100e212" providerId="LiveId" clId="{15D4631F-D760-4ADF-939B-954E88C3F303}" dt="2018-01-15T13:26:28.854" v="1381" actId="20577"/>
-        <pc:sldMkLst>
-          <pc:docMk/>
-          <pc:sldMk cId="917768929" sldId="258"/>
-        </pc:sldMkLst>
-        <pc:spChg chg="mod">
-          <ac:chgData name="Conrad Bessant" userId="d4e3a46bc100e212" providerId="LiveId" clId="{15D4631F-D760-4ADF-939B-954E88C3F303}" dt="2018-01-15T13:26:28.854" v="1381" actId="20577"/>
-          <ac:spMkLst>
-            <pc:docMk/>
-            <pc:sldMk cId="917768929" sldId="258"/>
-            <ac:spMk id="3" creationId="{1F0DA4CC-AAF3-411E-B11C-5A2B25ED3DDE}"/>
-          </ac:spMkLst>
-        </pc:spChg>
-      </pc:sldChg>
-      <pc:sldChg chg="addSp delSp modSp">
-        <pc:chgData name="Conrad Bessant" userId="d4e3a46bc100e212" providerId="LiveId" clId="{15D4631F-D760-4ADF-939B-954E88C3F303}" dt="2018-01-15T13:28:59.749" v="1414" actId="1076"/>
-        <pc:sldMkLst>
-          <pc:docMk/>
-          <pc:sldMk cId="1432115885" sldId="259"/>
-        </pc:sldMkLst>
-        <pc:spChg chg="mod">
-          <ac:chgData name="Conrad Bessant" userId="d4e3a46bc100e212" providerId="LiveId" clId="{15D4631F-D760-4ADF-939B-954E88C3F303}" dt="2018-01-15T12:28:44.757" v="965" actId="20577"/>
-          <ac:spMkLst>
-            <pc:docMk/>
-            <pc:sldMk cId="1432115885" sldId="259"/>
-            <ac:spMk id="2" creationId="{37ED8E29-5C26-4256-9E62-D456FF183713}"/>
-          </ac:spMkLst>
-        </pc:spChg>
-        <pc:spChg chg="add del mod topLvl">
-          <ac:chgData name="Conrad Bessant" userId="d4e3a46bc100e212" providerId="LiveId" clId="{15D4631F-D760-4ADF-939B-954E88C3F303}" dt="2018-01-15T13:28:43.364" v="1412" actId="478"/>
-          <ac:spMkLst>
-            <pc:docMk/>
-            <pc:sldMk cId="1432115885" sldId="259"/>
-            <ac:spMk id="9" creationId="{0DC1DE88-E988-4A9E-AEA8-D03A415FF99F}"/>
-          </ac:spMkLst>
-        </pc:spChg>
-        <pc:spChg chg="add del topLvl">
-          <ac:chgData name="Conrad Bessant" userId="d4e3a46bc100e212" providerId="LiveId" clId="{15D4631F-D760-4ADF-939B-954E88C3F303}" dt="2018-01-15T13:28:42.892" v="1411" actId="478"/>
-          <ac:spMkLst>
-            <pc:docMk/>
-            <pc:sldMk cId="1432115885" sldId="259"/>
-            <ac:spMk id="10" creationId="{70DAB898-C4A6-4957-9101-A6385E2184B5}"/>
-          </ac:spMkLst>
-        </pc:spChg>
-        <pc:spChg chg="mod">
-          <ac:chgData name="Conrad Bessant" userId="d4e3a46bc100e212" providerId="LiveId" clId="{15D4631F-D760-4ADF-939B-954E88C3F303}" dt="2018-01-15T11:23:30.446" v="273" actId="1076"/>
-          <ac:spMkLst>
-            <pc:docMk/>
-            <pc:sldMk cId="1432115885" sldId="259"/>
-            <ac:spMk id="12" creationId="{70C67898-0894-48BF-8A73-2BA4285D7E32}"/>
-          </ac:spMkLst>
-        </pc:spChg>
-        <pc:grpChg chg="add del mod">
-          <ac:chgData name="Conrad Bessant" userId="d4e3a46bc100e212" providerId="LiveId" clId="{15D4631F-D760-4ADF-939B-954E88C3F303}" dt="2018-01-15T13:28:59.749" v="1414" actId="1076"/>
-          <ac:grpSpMkLst>
-            <pc:docMk/>
-            <pc:sldMk cId="1432115885" sldId="259"/>
-            <ac:grpSpMk id="11" creationId="{36747371-ACD2-4F4B-BAB4-141DD8E83E86}"/>
-          </ac:grpSpMkLst>
-        </pc:grpChg>
-        <pc:cxnChg chg="mod">
-          <ac:chgData name="Conrad Bessant" userId="d4e3a46bc100e212" providerId="LiveId" clId="{15D4631F-D760-4ADF-939B-954E88C3F303}" dt="2018-01-15T11:23:25.810" v="271" actId="14100"/>
-          <ac:cxnSpMkLst>
-            <pc:docMk/>
-            <pc:sldMk cId="1432115885" sldId="259"/>
-            <ac:cxnSpMk id="13" creationId="{B9C8632A-3995-411B-8170-F7B1715972E6}"/>
-          </ac:cxnSpMkLst>
-        </pc:cxnChg>
-      </pc:sldChg>
-      <pc:sldChg chg="addSp delSp modSp modAnim">
-        <pc:chgData name="Conrad Bessant" userId="d4e3a46bc100e212" providerId="LiveId" clId="{15D4631F-D760-4ADF-939B-954E88C3F303}" dt="2018-01-15T13:29:05.071" v="1415"/>
+        <pc:chgData name="Conrad Bessant" userId="d4e3a46bc100e212" providerId="LiveId" clId="{4D90BB7C-8E2F-41F3-8217-EAAEC5D501B3}" dt="2018-12-18T10:52:52.681" v="1" actId="20577"/>
         <pc:sldMkLst>
           <pc:docMk/>
           <pc:sldMk cId="2494318239" sldId="260"/>
         </pc:sldMkLst>
         <pc:spChg chg="mod">
-          <ac:chgData name="Conrad Bessant" userId="d4e3a46bc100e212" providerId="LiveId" clId="{15D4631F-D760-4ADF-939B-954E88C3F303}" dt="2018-01-15T12:29:28.786" v="1057" actId="14100"/>
-          <ac:spMkLst>
-            <pc:docMk/>
-            <pc:sldMk cId="2494318239" sldId="260"/>
-            <ac:spMk id="2" creationId="{AC29381B-6029-4981-94DB-7A458412A022}"/>
-          </ac:spMkLst>
-        </pc:spChg>
-        <pc:spChg chg="mod">
-          <ac:chgData name="Conrad Bessant" userId="d4e3a46bc100e212" providerId="LiveId" clId="{15D4631F-D760-4ADF-939B-954E88C3F303}" dt="2018-01-15T12:19:30.787" v="901" actId="1076"/>
-          <ac:spMkLst>
-            <pc:docMk/>
-            <pc:sldMk cId="2494318239" sldId="260"/>
-            <ac:spMk id="4" creationId="{0BCC0936-8C0E-4786-9DEA-7D90A7CA644C}"/>
-          </ac:spMkLst>
-        </pc:spChg>
-        <pc:spChg chg="mod">
-          <ac:chgData name="Conrad Bessant" userId="d4e3a46bc100e212" providerId="LiveId" clId="{15D4631F-D760-4ADF-939B-954E88C3F303}" dt="2018-01-15T12:19:30.787" v="901" actId="1076"/>
-          <ac:spMkLst>
-            <pc:docMk/>
-            <pc:sldMk cId="2494318239" sldId="260"/>
-            <ac:spMk id="5" creationId="{CC190239-F4D1-4DB3-8866-160360E66BB8}"/>
-          </ac:spMkLst>
-        </pc:spChg>
-        <pc:spChg chg="mod">
-          <ac:chgData name="Conrad Bessant" userId="d4e3a46bc100e212" providerId="LiveId" clId="{15D4631F-D760-4ADF-939B-954E88C3F303}" dt="2018-01-15T12:19:30.787" v="901" actId="1076"/>
-          <ac:spMkLst>
-            <pc:docMk/>
-            <pc:sldMk cId="2494318239" sldId="260"/>
-            <ac:spMk id="6" creationId="{193ED532-91CD-414B-A867-681BAD0AF874}"/>
-          </ac:spMkLst>
-        </pc:spChg>
-        <pc:spChg chg="mod">
-          <ac:chgData name="Conrad Bessant" userId="d4e3a46bc100e212" providerId="LiveId" clId="{15D4631F-D760-4ADF-939B-954E88C3F303}" dt="2018-01-15T12:19:30.787" v="901" actId="1076"/>
-          <ac:spMkLst>
-            <pc:docMk/>
-            <pc:sldMk cId="2494318239" sldId="260"/>
-            <ac:spMk id="10" creationId="{9D9D8425-CE23-4DF1-8D8B-F4A9194AE433}"/>
-          </ac:spMkLst>
-        </pc:spChg>
-        <pc:spChg chg="mod">
-          <ac:chgData name="Conrad Bessant" userId="d4e3a46bc100e212" providerId="LiveId" clId="{15D4631F-D760-4ADF-939B-954E88C3F303}" dt="2018-01-15T12:19:30.787" v="901" actId="1076"/>
-          <ac:spMkLst>
-            <pc:docMk/>
-            <pc:sldMk cId="2494318239" sldId="260"/>
-            <ac:spMk id="11" creationId="{CE158F96-63D6-4865-8134-D373F89099A9}"/>
-          </ac:spMkLst>
-        </pc:spChg>
-        <pc:spChg chg="add mod">
-          <ac:chgData name="Conrad Bessant" userId="d4e3a46bc100e212" providerId="LiveId" clId="{15D4631F-D760-4ADF-939B-954E88C3F303}" dt="2018-01-15T12:19:30.787" v="901" actId="1076"/>
+          <ac:chgData name="Conrad Bessant" userId="d4e3a46bc100e212" providerId="LiveId" clId="{4D90BB7C-8E2F-41F3-8217-EAAEC5D501B3}" dt="2018-12-18T10:52:52.681" v="1" actId="20577"/>
           <ac:spMkLst>
             <pc:docMk/>
             <pc:sldMk cId="2494318239" sldId="260"/>
             <ac:spMk id="12" creationId="{1D2A0EA9-31B1-4016-B58B-2634F4A6E674}"/>
           </ac:spMkLst>
         </pc:spChg>
-        <pc:spChg chg="add del">
-          <ac:chgData name="Conrad Bessant" userId="d4e3a46bc100e212" providerId="LiveId" clId="{15D4631F-D760-4ADF-939B-954E88C3F303}" dt="2018-01-15T12:19:22.853" v="898"/>
-          <ac:spMkLst>
-            <pc:docMk/>
-            <pc:sldMk cId="2494318239" sldId="260"/>
-            <ac:spMk id="13" creationId="{BFD19117-9AD3-4665-9415-21C1DDDB89D5}"/>
-          </ac:spMkLst>
-        </pc:spChg>
-        <pc:spChg chg="add del mod">
-          <ac:chgData name="Conrad Bessant" userId="d4e3a46bc100e212" providerId="LiveId" clId="{15D4631F-D760-4ADF-939B-954E88C3F303}" dt="2018-01-15T12:19:22.853" v="898"/>
-          <ac:spMkLst>
-            <pc:docMk/>
-            <pc:sldMk cId="2494318239" sldId="260"/>
-            <ac:spMk id="14" creationId="{9F5022D3-900B-4280-B179-445445B7FC24}"/>
-          </ac:spMkLst>
-        </pc:spChg>
-        <pc:spChg chg="add mod">
-          <ac:chgData name="Conrad Bessant" userId="d4e3a46bc100e212" providerId="LiveId" clId="{15D4631F-D760-4ADF-939B-954E88C3F303}" dt="2018-01-15T12:19:39.418" v="903" actId="1076"/>
-          <ac:spMkLst>
-            <pc:docMk/>
-            <pc:sldMk cId="2494318239" sldId="260"/>
-            <ac:spMk id="15" creationId="{8994A854-67E7-4F7B-B80D-8EF0F37B9534}"/>
-          </ac:spMkLst>
-        </pc:spChg>
-        <pc:spChg chg="add mod">
-          <ac:chgData name="Conrad Bessant" userId="d4e3a46bc100e212" providerId="LiveId" clId="{15D4631F-D760-4ADF-939B-954E88C3F303}" dt="2018-01-15T12:19:39.418" v="903" actId="1076"/>
-          <ac:spMkLst>
-            <pc:docMk/>
-            <pc:sldMk cId="2494318239" sldId="260"/>
-            <ac:spMk id="16" creationId="{00BB48C6-9EE4-4C05-BB44-AA771898796C}"/>
-          </ac:spMkLst>
-        </pc:spChg>
-        <pc:grpChg chg="mod">
-          <ac:chgData name="Conrad Bessant" userId="d4e3a46bc100e212" providerId="LiveId" clId="{15D4631F-D760-4ADF-939B-954E88C3F303}" dt="2018-01-15T12:19:30.787" v="901" actId="1076"/>
-          <ac:grpSpMkLst>
-            <pc:docMk/>
-            <pc:sldMk cId="2494318239" sldId="260"/>
-            <ac:grpSpMk id="7" creationId="{3C1A80A9-0301-4222-B776-77522ABA0F2A}"/>
-          </ac:grpSpMkLst>
-        </pc:grpChg>
-      </pc:sldChg>
-      <pc:sldChg chg="addSp delSp modSp add modAnim">
-        <pc:chgData name="Conrad Bessant" userId="d4e3a46bc100e212" providerId="LiveId" clId="{15D4631F-D760-4ADF-939B-954E88C3F303}" dt="2018-01-15T13:29:10.061" v="1416"/>
-        <pc:sldMkLst>
-          <pc:docMk/>
-          <pc:sldMk cId="1568756276" sldId="261"/>
-        </pc:sldMkLst>
-        <pc:spChg chg="mod">
-          <ac:chgData name="Conrad Bessant" userId="d4e3a46bc100e212" providerId="LiveId" clId="{15D4631F-D760-4ADF-939B-954E88C3F303}" dt="2018-01-15T12:29:14.452" v="1043" actId="20577"/>
-          <ac:spMkLst>
-            <pc:docMk/>
-            <pc:sldMk cId="1568756276" sldId="261"/>
-            <ac:spMk id="2" creationId="{AC29381B-6029-4981-94DB-7A458412A022}"/>
-          </ac:spMkLst>
-        </pc:spChg>
-        <pc:spChg chg="mod">
-          <ac:chgData name="Conrad Bessant" userId="d4e3a46bc100e212" providerId="LiveId" clId="{15D4631F-D760-4ADF-939B-954E88C3F303}" dt="2018-01-15T11:20:02.728" v="3" actId="1076"/>
-          <ac:spMkLst>
-            <pc:docMk/>
-            <pc:sldMk cId="1568756276" sldId="261"/>
-            <ac:spMk id="4" creationId="{0BCC0936-8C0E-4786-9DEA-7D90A7CA644C}"/>
-          </ac:spMkLst>
-        </pc:spChg>
-        <pc:spChg chg="mod">
-          <ac:chgData name="Conrad Bessant" userId="d4e3a46bc100e212" providerId="LiveId" clId="{15D4631F-D760-4ADF-939B-954E88C3F303}" dt="2018-01-15T11:20:02.728" v="3" actId="1076"/>
-          <ac:spMkLst>
-            <pc:docMk/>
-            <pc:sldMk cId="1568756276" sldId="261"/>
-            <ac:spMk id="5" creationId="{CC190239-F4D1-4DB3-8866-160360E66BB8}"/>
-          </ac:spMkLst>
-        </pc:spChg>
-        <pc:spChg chg="mod">
-          <ac:chgData name="Conrad Bessant" userId="d4e3a46bc100e212" providerId="LiveId" clId="{15D4631F-D760-4ADF-939B-954E88C3F303}" dt="2018-01-15T11:20:02.728" v="3" actId="1076"/>
-          <ac:spMkLst>
-            <pc:docMk/>
-            <pc:sldMk cId="1568756276" sldId="261"/>
-            <ac:spMk id="6" creationId="{193ED532-91CD-414B-A867-681BAD0AF874}"/>
-          </ac:spMkLst>
-        </pc:spChg>
-        <pc:spChg chg="del mod">
-          <ac:chgData name="Conrad Bessant" userId="d4e3a46bc100e212" providerId="LiveId" clId="{15D4631F-D760-4ADF-939B-954E88C3F303}" dt="2018-01-15T12:17:59.881" v="860" actId="478"/>
-          <ac:spMkLst>
-            <pc:docMk/>
-            <pc:sldMk cId="1568756276" sldId="261"/>
-            <ac:spMk id="10" creationId="{9D9D8425-CE23-4DF1-8D8B-F4A9194AE433}"/>
-          </ac:spMkLst>
-        </pc:spChg>
-        <pc:spChg chg="mod">
-          <ac:chgData name="Conrad Bessant" userId="d4e3a46bc100e212" providerId="LiveId" clId="{15D4631F-D760-4ADF-939B-954E88C3F303}" dt="2018-01-15T11:20:02.728" v="3" actId="1076"/>
-          <ac:spMkLst>
-            <pc:docMk/>
-            <pc:sldMk cId="1568756276" sldId="261"/>
-            <ac:spMk id="11" creationId="{CE158F96-63D6-4865-8134-D373F89099A9}"/>
-          </ac:spMkLst>
-        </pc:spChg>
-        <pc:spChg chg="add del mod">
-          <ac:chgData name="Conrad Bessant" userId="d4e3a46bc100e212" providerId="LiveId" clId="{15D4631F-D760-4ADF-939B-954E88C3F303}" dt="2018-01-15T12:17:56.703" v="859" actId="478"/>
-          <ac:spMkLst>
-            <pc:docMk/>
-            <pc:sldMk cId="1568756276" sldId="261"/>
-            <ac:spMk id="12" creationId="{BEB435E1-B8C7-4F16-A5F2-52C305EFA7A3}"/>
-          </ac:spMkLst>
-        </pc:spChg>
-        <pc:spChg chg="add mod">
-          <ac:chgData name="Conrad Bessant" userId="d4e3a46bc100e212" providerId="LiveId" clId="{15D4631F-D760-4ADF-939B-954E88C3F303}" dt="2018-01-15T12:18:25.270" v="867" actId="1076"/>
-          <ac:spMkLst>
-            <pc:docMk/>
-            <pc:sldMk cId="1568756276" sldId="261"/>
-            <ac:spMk id="13" creationId="{69BCCBDC-EE05-4BEA-8D2B-E9B66F10495B}"/>
-          </ac:spMkLst>
-        </pc:spChg>
-        <pc:spChg chg="add">
-          <ac:chgData name="Conrad Bessant" userId="d4e3a46bc100e212" providerId="LiveId" clId="{15D4631F-D760-4ADF-939B-954E88C3F303}" dt="2018-01-15T12:18:00.844" v="861"/>
-          <ac:spMkLst>
-            <pc:docMk/>
-            <pc:sldMk cId="1568756276" sldId="261"/>
-            <ac:spMk id="14" creationId="{E1630A55-19CB-403A-8A21-3102BE7C7A13}"/>
-          </ac:spMkLst>
-        </pc:spChg>
-        <pc:spChg chg="add mod">
-          <ac:chgData name="Conrad Bessant" userId="d4e3a46bc100e212" providerId="LiveId" clId="{15D4631F-D760-4ADF-939B-954E88C3F303}" dt="2018-01-15T12:18:25.270" v="867" actId="1076"/>
-          <ac:spMkLst>
-            <pc:docMk/>
-            <pc:sldMk cId="1568756276" sldId="261"/>
-            <ac:spMk id="15" creationId="{F45CAA16-BBA1-47BA-8A93-CDA343FA72BC}"/>
-          </ac:spMkLst>
-        </pc:spChg>
-        <pc:spChg chg="add mod">
-          <ac:chgData name="Conrad Bessant" userId="d4e3a46bc100e212" providerId="LiveId" clId="{15D4631F-D760-4ADF-939B-954E88C3F303}" dt="2018-01-15T12:18:49.266" v="893" actId="1076"/>
-          <ac:spMkLst>
-            <pc:docMk/>
-            <pc:sldMk cId="1568756276" sldId="261"/>
-            <ac:spMk id="16" creationId="{9581D5AB-1C35-407C-82D7-50053DDAD58B}"/>
-          </ac:spMkLst>
-        </pc:spChg>
-        <pc:spChg chg="add mod">
-          <ac:chgData name="Conrad Bessant" userId="d4e3a46bc100e212" providerId="LiveId" clId="{15D4631F-D760-4ADF-939B-954E88C3F303}" dt="2018-01-15T12:18:30.409" v="868" actId="571"/>
-          <ac:spMkLst>
-            <pc:docMk/>
-            <pc:sldMk cId="1568756276" sldId="261"/>
-            <ac:spMk id="17" creationId="{1AAF6F0C-7B52-4137-90EF-5A1F55D52E29}"/>
-          </ac:spMkLst>
-        </pc:spChg>
-        <pc:grpChg chg="mod">
-          <ac:chgData name="Conrad Bessant" userId="d4e3a46bc100e212" providerId="LiveId" clId="{15D4631F-D760-4ADF-939B-954E88C3F303}" dt="2018-01-15T11:20:02.728" v="3" actId="1076"/>
-          <ac:grpSpMkLst>
-            <pc:docMk/>
-            <pc:sldMk cId="1568756276" sldId="261"/>
-            <ac:grpSpMk id="7" creationId="{3C1A80A9-0301-4222-B776-77522ABA0F2A}"/>
-          </ac:grpSpMkLst>
-        </pc:grpChg>
-      </pc:sldChg>
-      <pc:sldChg chg="addSp delSp modSp add modAnim">
-        <pc:chgData name="Conrad Bessant" userId="d4e3a46bc100e212" providerId="LiveId" clId="{15D4631F-D760-4ADF-939B-954E88C3F303}" dt="2018-01-15T13:29:15.233" v="1417"/>
-        <pc:sldMkLst>
-          <pc:docMk/>
-          <pc:sldMk cId="1532459044" sldId="262"/>
-        </pc:sldMkLst>
-        <pc:spChg chg="mod">
-          <ac:chgData name="Conrad Bessant" userId="d4e3a46bc100e212" providerId="LiveId" clId="{15D4631F-D760-4ADF-939B-954E88C3F303}" dt="2018-01-15T12:29:57.060" v="1165" actId="20577"/>
-          <ac:spMkLst>
-            <pc:docMk/>
-            <pc:sldMk cId="1532459044" sldId="262"/>
-            <ac:spMk id="2" creationId="{AC29381B-6029-4981-94DB-7A458412A022}"/>
-          </ac:spMkLst>
-        </pc:spChg>
-        <pc:spChg chg="add mod">
-          <ac:chgData name="Conrad Bessant" userId="d4e3a46bc100e212" providerId="LiveId" clId="{15D4631F-D760-4ADF-939B-954E88C3F303}" dt="2018-01-15T12:17:27.369" v="851" actId="1076"/>
-          <ac:spMkLst>
-            <pc:docMk/>
-            <pc:sldMk cId="1532459044" sldId="262"/>
-            <ac:spMk id="3" creationId="{687E6EA5-D5F9-4735-BD83-935E4BF781B4}"/>
-          </ac:spMkLst>
-        </pc:spChg>
-        <pc:spChg chg="del">
-          <ac:chgData name="Conrad Bessant" userId="d4e3a46bc100e212" providerId="LiveId" clId="{15D4631F-D760-4ADF-939B-954E88C3F303}" dt="2018-01-15T12:16:57.600" v="842" actId="478"/>
-          <ac:spMkLst>
-            <pc:docMk/>
-            <pc:sldMk cId="1532459044" sldId="262"/>
-            <ac:spMk id="10" creationId="{9D9D8425-CE23-4DF1-8D8B-F4A9194AE433}"/>
-          </ac:spMkLst>
-        </pc:spChg>
-        <pc:spChg chg="del mod">
-          <ac:chgData name="Conrad Bessant" userId="d4e3a46bc100e212" providerId="LiveId" clId="{15D4631F-D760-4ADF-939B-954E88C3F303}" dt="2018-01-15T12:16:56.176" v="840" actId="478"/>
-          <ac:spMkLst>
-            <pc:docMk/>
-            <pc:sldMk cId="1532459044" sldId="262"/>
-            <ac:spMk id="12" creationId="{BEB435E1-B8C7-4F16-A5F2-52C305EFA7A3}"/>
-          </ac:spMkLst>
-        </pc:spChg>
-        <pc:spChg chg="mod">
-          <ac:chgData name="Conrad Bessant" userId="d4e3a46bc100e212" providerId="LiveId" clId="{15D4631F-D760-4ADF-939B-954E88C3F303}" dt="2018-01-15T11:23:55.759" v="288" actId="20577"/>
-          <ac:spMkLst>
-            <pc:docMk/>
-            <pc:sldMk cId="1532459044" sldId="262"/>
-            <ac:spMk id="13" creationId="{69BCCBDC-EE05-4BEA-8D2B-E9B66F10495B}"/>
-          </ac:spMkLst>
-        </pc:spChg>
-        <pc:spChg chg="add mod">
-          <ac:chgData name="Conrad Bessant" userId="d4e3a46bc100e212" providerId="LiveId" clId="{15D4631F-D760-4ADF-939B-954E88C3F303}" dt="2018-01-15T11:29:10.159" v="839" actId="20577"/>
-          <ac:spMkLst>
-            <pc:docMk/>
-            <pc:sldMk cId="1532459044" sldId="262"/>
-            <ac:spMk id="14" creationId="{0CAD8FC2-AA9C-4535-AC45-2AA41B1C4FEF}"/>
-          </ac:spMkLst>
-        </pc:spChg>
-        <pc:spChg chg="add del mod">
-          <ac:chgData name="Conrad Bessant" userId="d4e3a46bc100e212" providerId="LiveId" clId="{15D4631F-D760-4ADF-939B-954E88C3F303}" dt="2018-01-15T12:16:56.953" v="841" actId="478"/>
-          <ac:spMkLst>
-            <pc:docMk/>
-            <pc:sldMk cId="1532459044" sldId="262"/>
-            <ac:spMk id="15" creationId="{96A7B9DA-6C9E-42E6-A2DC-E61F9BD471E0}"/>
-          </ac:spMkLst>
-        </pc:spChg>
-        <pc:spChg chg="add mod">
-          <ac:chgData name="Conrad Bessant" userId="d4e3a46bc100e212" providerId="LiveId" clId="{15D4631F-D760-4ADF-939B-954E88C3F303}" dt="2018-01-15T12:17:37.625" v="855" actId="1076"/>
-          <ac:spMkLst>
-            <pc:docMk/>
-            <pc:sldMk cId="1532459044" sldId="262"/>
-            <ac:spMk id="16" creationId="{402A6649-9D64-4391-B453-0D39EF99CCAD}"/>
-          </ac:spMkLst>
-        </pc:spChg>
-        <pc:spChg chg="add mod">
-          <ac:chgData name="Conrad Bessant" userId="d4e3a46bc100e212" providerId="LiveId" clId="{15D4631F-D760-4ADF-939B-954E88C3F303}" dt="2018-01-15T12:17:46.525" v="858" actId="1076"/>
-          <ac:spMkLst>
-            <pc:docMk/>
-            <pc:sldMk cId="1532459044" sldId="262"/>
-            <ac:spMk id="17" creationId="{5AFAED6A-5B0C-4CBC-8B59-D5D53357D497}"/>
-          </ac:spMkLst>
-        </pc:spChg>
-        <pc:spChg chg="add">
-          <ac:chgData name="Conrad Bessant" userId="d4e3a46bc100e212" providerId="LiveId" clId="{15D4631F-D760-4ADF-939B-954E88C3F303}" dt="2018-01-15T12:19:02.832" v="894"/>
-          <ac:spMkLst>
-            <pc:docMk/>
-            <pc:sldMk cId="1532459044" sldId="262"/>
-            <ac:spMk id="18" creationId="{F83A5778-A8F6-48FC-B29F-CD9531422BB3}"/>
-          </ac:spMkLst>
-        </pc:spChg>
-        <pc:spChg chg="add">
-          <ac:chgData name="Conrad Bessant" userId="d4e3a46bc100e212" providerId="LiveId" clId="{15D4631F-D760-4ADF-939B-954E88C3F303}" dt="2018-01-15T12:19:02.832" v="894"/>
-          <ac:spMkLst>
-            <pc:docMk/>
-            <pc:sldMk cId="1532459044" sldId="262"/>
-            <ac:spMk id="19" creationId="{CE04321B-0DB2-4657-95D5-30E471ECD73A}"/>
-          </ac:spMkLst>
-        </pc:spChg>
-      </pc:sldChg>
-      <pc:sldChg chg="modSp add">
-        <pc:chgData name="Conrad Bessant" userId="d4e3a46bc100e212" providerId="LiveId" clId="{15D4631F-D760-4ADF-939B-954E88C3F303}" dt="2018-01-15T13:31:34.064" v="1549" actId="6549"/>
-        <pc:sldMkLst>
-          <pc:docMk/>
-          <pc:sldMk cId="2442050802" sldId="263"/>
-        </pc:sldMkLst>
-        <pc:spChg chg="mod">
-          <ac:chgData name="Conrad Bessant" userId="d4e3a46bc100e212" providerId="LiveId" clId="{15D4631F-D760-4ADF-939B-954E88C3F303}" dt="2018-01-15T11:26:56.790" v="636" actId="20577"/>
-          <ac:spMkLst>
-            <pc:docMk/>
-            <pc:sldMk cId="2442050802" sldId="263"/>
-            <ac:spMk id="2" creationId="{BA748991-DE37-4431-A688-97DAC25058D9}"/>
-          </ac:spMkLst>
-        </pc:spChg>
-        <pc:spChg chg="mod">
-          <ac:chgData name="Conrad Bessant" userId="d4e3a46bc100e212" providerId="LiveId" clId="{15D4631F-D760-4ADF-939B-954E88C3F303}" dt="2018-01-15T13:31:34.064" v="1549" actId="6549"/>
-          <ac:spMkLst>
-            <pc:docMk/>
-            <pc:sldMk cId="2442050802" sldId="263"/>
-            <ac:spMk id="3" creationId="{0736B900-CE3E-4C70-9071-86112A6ECD98}"/>
-          </ac:spMkLst>
-        </pc:spChg>
-      </pc:sldChg>
-      <pc:sldChg chg="modSp add">
-        <pc:chgData name="Conrad Bessant" userId="d4e3a46bc100e212" providerId="LiveId" clId="{15D4631F-D760-4ADF-939B-954E88C3F303}" dt="2018-01-15T13:22:31.658" v="1187" actId="403"/>
-        <pc:sldMkLst>
-          <pc:docMk/>
-          <pc:sldMk cId="996041999" sldId="264"/>
-        </pc:sldMkLst>
-        <pc:spChg chg="mod">
-          <ac:chgData name="Conrad Bessant" userId="d4e3a46bc100e212" providerId="LiveId" clId="{15D4631F-D760-4ADF-939B-954E88C3F303}" dt="2018-01-15T13:22:21.678" v="1185" actId="6549"/>
-          <ac:spMkLst>
-            <pc:docMk/>
-            <pc:sldMk cId="996041999" sldId="264"/>
-            <ac:spMk id="2" creationId="{4C638070-9814-4D3C-B7B8-FD33F6BAF5E4}"/>
-          </ac:spMkLst>
-        </pc:spChg>
-        <pc:spChg chg="mod">
-          <ac:chgData name="Conrad Bessant" userId="d4e3a46bc100e212" providerId="LiveId" clId="{15D4631F-D760-4ADF-939B-954E88C3F303}" dt="2018-01-15T13:22:31.658" v="1187" actId="403"/>
-          <ac:spMkLst>
-            <pc:docMk/>
-            <pc:sldMk cId="996041999" sldId="264"/>
-            <ac:spMk id="3" creationId="{156A3EF7-2439-4546-9FE6-40FACA171D65}"/>
-          </ac:spMkLst>
-        </pc:spChg>
       </pc:sldChg>
     </pc:docChg>
+  </pc:docChgLst>
+  <pc:docChgLst>
+    <pc:chgData name="Conrad Bessant" userId="d4e3a46bc100e212" providerId="LiveId" clId="{15D4631F-D760-4ADF-939B-954E88C3F303}"/>
   </pc:docChgLst>
 </pc:chgInfo>
 </file>
@@ -781,7 +301,7 @@
           <a:p>
             <a:fld id="{349C7AD5-8D17-4F45-9111-E5C09C8627AF}" type="datetimeFigureOut">
               <a:rPr lang="en-GB" smtClean="0"/>
-              <a:t>15/01/2018</a:t>
+              <a:t>18/12/2018</a:t>
             </a:fld>
             <a:endParaRPr lang="en-GB"/>
           </a:p>
@@ -981,7 +501,7 @@
           <a:p>
             <a:fld id="{349C7AD5-8D17-4F45-9111-E5C09C8627AF}" type="datetimeFigureOut">
               <a:rPr lang="en-GB" smtClean="0"/>
-              <a:t>15/01/2018</a:t>
+              <a:t>18/12/2018</a:t>
             </a:fld>
             <a:endParaRPr lang="en-GB"/>
           </a:p>
@@ -1191,7 +711,7 @@
           <a:p>
             <a:fld id="{349C7AD5-8D17-4F45-9111-E5C09C8627AF}" type="datetimeFigureOut">
               <a:rPr lang="en-GB" smtClean="0"/>
-              <a:t>15/01/2018</a:t>
+              <a:t>18/12/2018</a:t>
             </a:fld>
             <a:endParaRPr lang="en-GB"/>
           </a:p>
@@ -1391,7 +911,7 @@
           <a:p>
             <a:fld id="{349C7AD5-8D17-4F45-9111-E5C09C8627AF}" type="datetimeFigureOut">
               <a:rPr lang="en-GB" smtClean="0"/>
-              <a:t>15/01/2018</a:t>
+              <a:t>18/12/2018</a:t>
             </a:fld>
             <a:endParaRPr lang="en-GB"/>
           </a:p>
@@ -1667,7 +1187,7 @@
           <a:p>
             <a:fld id="{349C7AD5-8D17-4F45-9111-E5C09C8627AF}" type="datetimeFigureOut">
               <a:rPr lang="en-GB" smtClean="0"/>
-              <a:t>15/01/2018</a:t>
+              <a:t>18/12/2018</a:t>
             </a:fld>
             <a:endParaRPr lang="en-GB"/>
           </a:p>
@@ -1935,7 +1455,7 @@
           <a:p>
             <a:fld id="{349C7AD5-8D17-4F45-9111-E5C09C8627AF}" type="datetimeFigureOut">
               <a:rPr lang="en-GB" smtClean="0"/>
-              <a:t>15/01/2018</a:t>
+              <a:t>18/12/2018</a:t>
             </a:fld>
             <a:endParaRPr lang="en-GB"/>
           </a:p>
@@ -2350,7 +1870,7 @@
           <a:p>
             <a:fld id="{349C7AD5-8D17-4F45-9111-E5C09C8627AF}" type="datetimeFigureOut">
               <a:rPr lang="en-GB" smtClean="0"/>
-              <a:t>15/01/2018</a:t>
+              <a:t>18/12/2018</a:t>
             </a:fld>
             <a:endParaRPr lang="en-GB"/>
           </a:p>
@@ -2492,7 +2012,7 @@
           <a:p>
             <a:fld id="{349C7AD5-8D17-4F45-9111-E5C09C8627AF}" type="datetimeFigureOut">
               <a:rPr lang="en-GB" smtClean="0"/>
-              <a:t>15/01/2018</a:t>
+              <a:t>18/12/2018</a:t>
             </a:fld>
             <a:endParaRPr lang="en-GB"/>
           </a:p>
@@ -2605,7 +2125,7 @@
           <a:p>
             <a:fld id="{349C7AD5-8D17-4F45-9111-E5C09C8627AF}" type="datetimeFigureOut">
               <a:rPr lang="en-GB" smtClean="0"/>
-              <a:t>15/01/2018</a:t>
+              <a:t>18/12/2018</a:t>
             </a:fld>
             <a:endParaRPr lang="en-GB"/>
           </a:p>
@@ -2918,7 +2438,7 @@
           <a:p>
             <a:fld id="{349C7AD5-8D17-4F45-9111-E5C09C8627AF}" type="datetimeFigureOut">
               <a:rPr lang="en-GB" smtClean="0"/>
-              <a:t>15/01/2018</a:t>
+              <a:t>18/12/2018</a:t>
             </a:fld>
             <a:endParaRPr lang="en-GB"/>
           </a:p>
@@ -3207,7 +2727,7 @@
           <a:p>
             <a:fld id="{349C7AD5-8D17-4F45-9111-E5C09C8627AF}" type="datetimeFigureOut">
               <a:rPr lang="en-GB" smtClean="0"/>
-              <a:t>15/01/2018</a:t>
+              <a:t>18/12/2018</a:t>
             </a:fld>
             <a:endParaRPr lang="en-GB"/>
           </a:p>
@@ -3450,7 +2970,7 @@
           <a:p>
             <a:fld id="{349C7AD5-8D17-4F45-9111-E5C09C8627AF}" type="datetimeFigureOut">
               <a:rPr lang="en-GB" smtClean="0"/>
-              <a:t>15/01/2018</a:t>
+              <a:t>18/12/2018</a:t>
             </a:fld>
             <a:endParaRPr lang="en-GB"/>
           </a:p>
@@ -5546,7 +5066,15 @@
           <a:p>
             <a:r>
               <a:rPr lang="en-GB" dirty="0"/>
-              <a:t>For simplicity, we use pandas to retrieve data from the table.</a:t>
+              <a:t>For simplicity, we </a:t>
+            </a:r>
+            <a:r>
+              <a:rPr lang="en-GB"/>
+              <a:t>use Pandas </a:t>
+            </a:r>
+            <a:r>
+              <a:rPr lang="en-GB" dirty="0"/>
+              <a:t>to retrieve data from the table.</a:t>
             </a:r>
           </a:p>
         </p:txBody>

</xml_diff>

<commit_message>
Fixed even more typos (in the PPT)
</commit_message>
<xml_diff>
--- a/explanation.pptx
+++ b/explanation.pptx
@@ -13,7 +13,6 @@
     <p:sldId id="261" r:id="rId7"/>
     <p:sldId id="262" r:id="rId8"/>
     <p:sldId id="263" r:id="rId9"/>
-    <p:sldId id="264" r:id="rId10"/>
   </p:sldIdLst>
   <p:sldSz cx="12192000" cy="6858000"/>
   <p:notesSz cx="6858000" cy="9144000"/>
@@ -124,11 +123,26 @@
 <pc:chgInfo xmlns:a="http://schemas.openxmlformats.org/drawingml/2006/main" xmlns:r="http://schemas.openxmlformats.org/officeDocument/2006/relationships" xmlns:ac="http://schemas.microsoft.com/office/drawing/2013/main/command" xmlns:pc="http://schemas.microsoft.com/office/powerpoint/2013/main/command">
   <pc:docChgLst>
     <pc:chgData name="Conrad Bessant" userId="d4e3a46bc100e212" providerId="LiveId" clId="{4D90BB7C-8E2F-41F3-8217-EAAEC5D501B3}"/>
-    <pc:docChg chg="modSld">
-      <pc:chgData name="Conrad Bessant" userId="d4e3a46bc100e212" providerId="LiveId" clId="{4D90BB7C-8E2F-41F3-8217-EAAEC5D501B3}" dt="2018-12-18T10:52:52.681" v="1" actId="20577"/>
+    <pc:docChg chg="custSel modSld">
+      <pc:chgData name="Conrad Bessant" userId="d4e3a46bc100e212" providerId="LiveId" clId="{4D90BB7C-8E2F-41F3-8217-EAAEC5D501B3}" dt="2018-12-18T15:56:19.429" v="2" actId="313"/>
       <pc:docMkLst>
         <pc:docMk/>
       </pc:docMkLst>
+      <pc:sldChg chg="modSp">
+        <pc:chgData name="Conrad Bessant" userId="d4e3a46bc100e212" providerId="LiveId" clId="{4D90BB7C-8E2F-41F3-8217-EAAEC5D501B3}" dt="2018-12-18T15:56:19.429" v="2" actId="313"/>
+        <pc:sldMkLst>
+          <pc:docMk/>
+          <pc:sldMk cId="917768929" sldId="258"/>
+        </pc:sldMkLst>
+        <pc:spChg chg="mod">
+          <ac:chgData name="Conrad Bessant" userId="d4e3a46bc100e212" providerId="LiveId" clId="{4D90BB7C-8E2F-41F3-8217-EAAEC5D501B3}" dt="2018-12-18T15:56:19.429" v="2" actId="313"/>
+          <ac:spMkLst>
+            <pc:docMk/>
+            <pc:sldMk cId="917768929" sldId="258"/>
+            <ac:spMk id="2" creationId="{FF348AEB-35BF-47FF-960D-01A0AFE995B0}"/>
+          </ac:spMkLst>
+        </pc:spChg>
+      </pc:sldChg>
       <pc:sldChg chg="modSp">
         <pc:chgData name="Conrad Bessant" userId="d4e3a46bc100e212" providerId="LiveId" clId="{4D90BB7C-8E2F-41F3-8217-EAAEC5D501B3}" dt="2018-12-18T10:52:52.681" v="1" actId="20577"/>
         <pc:sldMkLst>
@@ -148,6 +162,67 @@
   </pc:docChgLst>
   <pc:docChgLst>
     <pc:chgData name="Conrad Bessant" userId="d4e3a46bc100e212" providerId="LiveId" clId="{15D4631F-D760-4ADF-939B-954E88C3F303}"/>
+  </pc:docChgLst>
+  <pc:docChgLst>
+    <pc:chgData name="Conrad Bessant" userId="d4e3a46bc100e212" providerId="LiveId" clId="{30EED129-B497-4BCB-8DFB-6682A2B706B8}"/>
+    <pc:docChg chg="delSld modSld">
+      <pc:chgData name="Conrad Bessant" userId="d4e3a46bc100e212" providerId="LiveId" clId="{30EED129-B497-4BCB-8DFB-6682A2B706B8}" dt="2020-01-06T08:46:16.271" v="3" actId="47"/>
+      <pc:docMkLst>
+        <pc:docMk/>
+      </pc:docMkLst>
+      <pc:sldChg chg="modSp">
+        <pc:chgData name="Conrad Bessant" userId="d4e3a46bc100e212" providerId="LiveId" clId="{30EED129-B497-4BCB-8DFB-6682A2B706B8}" dt="2020-01-06T08:45:35.496" v="0" actId="6549"/>
+        <pc:sldMkLst>
+          <pc:docMk/>
+          <pc:sldMk cId="2494318239" sldId="260"/>
+        </pc:sldMkLst>
+        <pc:spChg chg="mod">
+          <ac:chgData name="Conrad Bessant" userId="d4e3a46bc100e212" providerId="LiveId" clId="{30EED129-B497-4BCB-8DFB-6682A2B706B8}" dt="2020-01-06T08:45:35.496" v="0" actId="6549"/>
+          <ac:spMkLst>
+            <pc:docMk/>
+            <pc:sldMk cId="2494318239" sldId="260"/>
+            <ac:spMk id="2" creationId="{AC29381B-6029-4981-94DB-7A458412A022}"/>
+          </ac:spMkLst>
+        </pc:spChg>
+      </pc:sldChg>
+      <pc:sldChg chg="modSp">
+        <pc:chgData name="Conrad Bessant" userId="d4e3a46bc100e212" providerId="LiveId" clId="{30EED129-B497-4BCB-8DFB-6682A2B706B8}" dt="2020-01-06T08:45:41.607" v="1" actId="20577"/>
+        <pc:sldMkLst>
+          <pc:docMk/>
+          <pc:sldMk cId="1568756276" sldId="261"/>
+        </pc:sldMkLst>
+        <pc:spChg chg="mod">
+          <ac:chgData name="Conrad Bessant" userId="d4e3a46bc100e212" providerId="LiveId" clId="{30EED129-B497-4BCB-8DFB-6682A2B706B8}" dt="2020-01-06T08:45:41.607" v="1" actId="20577"/>
+          <ac:spMkLst>
+            <pc:docMk/>
+            <pc:sldMk cId="1568756276" sldId="261"/>
+            <ac:spMk id="2" creationId="{AC29381B-6029-4981-94DB-7A458412A022}"/>
+          </ac:spMkLst>
+        </pc:spChg>
+      </pc:sldChg>
+      <pc:sldChg chg="modSp">
+        <pc:chgData name="Conrad Bessant" userId="d4e3a46bc100e212" providerId="LiveId" clId="{30EED129-B497-4BCB-8DFB-6682A2B706B8}" dt="2020-01-06T08:45:47.062" v="2" actId="6549"/>
+        <pc:sldMkLst>
+          <pc:docMk/>
+          <pc:sldMk cId="1532459044" sldId="262"/>
+        </pc:sldMkLst>
+        <pc:spChg chg="mod">
+          <ac:chgData name="Conrad Bessant" userId="d4e3a46bc100e212" providerId="LiveId" clId="{30EED129-B497-4BCB-8DFB-6682A2B706B8}" dt="2020-01-06T08:45:47.062" v="2" actId="6549"/>
+          <ac:spMkLst>
+            <pc:docMk/>
+            <pc:sldMk cId="1532459044" sldId="262"/>
+            <ac:spMk id="2" creationId="{AC29381B-6029-4981-94DB-7A458412A022}"/>
+          </ac:spMkLst>
+        </pc:spChg>
+      </pc:sldChg>
+      <pc:sldChg chg="del">
+        <pc:chgData name="Conrad Bessant" userId="d4e3a46bc100e212" providerId="LiveId" clId="{30EED129-B497-4BCB-8DFB-6682A2B706B8}" dt="2020-01-06T08:46:16.271" v="3" actId="47"/>
+        <pc:sldMkLst>
+          <pc:docMk/>
+          <pc:sldMk cId="996041999" sldId="264"/>
+        </pc:sldMkLst>
+      </pc:sldChg>
+    </pc:docChg>
   </pc:docChgLst>
 </pc:chgInfo>
 </file>
@@ -301,7 +376,7 @@
           <a:p>
             <a:fld id="{349C7AD5-8D17-4F45-9111-E5C09C8627AF}" type="datetimeFigureOut">
               <a:rPr lang="en-GB" smtClean="0"/>
-              <a:t>18/12/2018</a:t>
+              <a:t>06/01/2020</a:t>
             </a:fld>
             <a:endParaRPr lang="en-GB"/>
           </a:p>
@@ -501,7 +576,7 @@
           <a:p>
             <a:fld id="{349C7AD5-8D17-4F45-9111-E5C09C8627AF}" type="datetimeFigureOut">
               <a:rPr lang="en-GB" smtClean="0"/>
-              <a:t>18/12/2018</a:t>
+              <a:t>06/01/2020</a:t>
             </a:fld>
             <a:endParaRPr lang="en-GB"/>
           </a:p>
@@ -711,7 +786,7 @@
           <a:p>
             <a:fld id="{349C7AD5-8D17-4F45-9111-E5C09C8627AF}" type="datetimeFigureOut">
               <a:rPr lang="en-GB" smtClean="0"/>
-              <a:t>18/12/2018</a:t>
+              <a:t>06/01/2020</a:t>
             </a:fld>
             <a:endParaRPr lang="en-GB"/>
           </a:p>
@@ -911,7 +986,7 @@
           <a:p>
             <a:fld id="{349C7AD5-8D17-4F45-9111-E5C09C8627AF}" type="datetimeFigureOut">
               <a:rPr lang="en-GB" smtClean="0"/>
-              <a:t>18/12/2018</a:t>
+              <a:t>06/01/2020</a:t>
             </a:fld>
             <a:endParaRPr lang="en-GB"/>
           </a:p>
@@ -1187,7 +1262,7 @@
           <a:p>
             <a:fld id="{349C7AD5-8D17-4F45-9111-E5C09C8627AF}" type="datetimeFigureOut">
               <a:rPr lang="en-GB" smtClean="0"/>
-              <a:t>18/12/2018</a:t>
+              <a:t>06/01/2020</a:t>
             </a:fld>
             <a:endParaRPr lang="en-GB"/>
           </a:p>
@@ -1455,7 +1530,7 @@
           <a:p>
             <a:fld id="{349C7AD5-8D17-4F45-9111-E5C09C8627AF}" type="datetimeFigureOut">
               <a:rPr lang="en-GB" smtClean="0"/>
-              <a:t>18/12/2018</a:t>
+              <a:t>06/01/2020</a:t>
             </a:fld>
             <a:endParaRPr lang="en-GB"/>
           </a:p>
@@ -1870,7 +1945,7 @@
           <a:p>
             <a:fld id="{349C7AD5-8D17-4F45-9111-E5C09C8627AF}" type="datetimeFigureOut">
               <a:rPr lang="en-GB" smtClean="0"/>
-              <a:t>18/12/2018</a:t>
+              <a:t>06/01/2020</a:t>
             </a:fld>
             <a:endParaRPr lang="en-GB"/>
           </a:p>
@@ -2012,7 +2087,7 @@
           <a:p>
             <a:fld id="{349C7AD5-8D17-4F45-9111-E5C09C8627AF}" type="datetimeFigureOut">
               <a:rPr lang="en-GB" smtClean="0"/>
-              <a:t>18/12/2018</a:t>
+              <a:t>06/01/2020</a:t>
             </a:fld>
             <a:endParaRPr lang="en-GB"/>
           </a:p>
@@ -2125,7 +2200,7 @@
           <a:p>
             <a:fld id="{349C7AD5-8D17-4F45-9111-E5C09C8627AF}" type="datetimeFigureOut">
               <a:rPr lang="en-GB" smtClean="0"/>
-              <a:t>18/12/2018</a:t>
+              <a:t>06/01/2020</a:t>
             </a:fld>
             <a:endParaRPr lang="en-GB"/>
           </a:p>
@@ -2438,7 +2513,7 @@
           <a:p>
             <a:fld id="{349C7AD5-8D17-4F45-9111-E5C09C8627AF}" type="datetimeFigureOut">
               <a:rPr lang="en-GB" smtClean="0"/>
-              <a:t>18/12/2018</a:t>
+              <a:t>06/01/2020</a:t>
             </a:fld>
             <a:endParaRPr lang="en-GB"/>
           </a:p>
@@ -2727,7 +2802,7 @@
           <a:p>
             <a:fld id="{349C7AD5-8D17-4F45-9111-E5C09C8627AF}" type="datetimeFigureOut">
               <a:rPr lang="en-GB" smtClean="0"/>
-              <a:t>18/12/2018</a:t>
+              <a:t>06/01/2020</a:t>
             </a:fld>
             <a:endParaRPr lang="en-GB"/>
           </a:p>
@@ -2970,7 +3045,7 @@
           <a:p>
             <a:fld id="{349C7AD5-8D17-4F45-9111-E5C09C8627AF}" type="datetimeFigureOut">
               <a:rPr lang="en-GB" smtClean="0"/>
-              <a:t>18/12/2018</a:t>
+              <a:t>06/01/2020</a:t>
             </a:fld>
             <a:endParaRPr lang="en-GB"/>
           </a:p>
@@ -3496,13 +3571,8 @@
           <a:p>
             <a:r>
               <a:rPr lang="en-GB" dirty="0"/>
-              <a:t>Software </a:t>
-            </a:r>
-            <a:r>
-              <a:rPr lang="en-GB" dirty="0" err="1"/>
-              <a:t>specitication</a:t>
-            </a:r>
-            <a:endParaRPr lang="en-GB" dirty="0"/>
+              <a:t>Software specification</a:t>
+            </a:r>
           </a:p>
         </p:txBody>
       </p:sp>
@@ -4697,7 +4767,7 @@
           <a:p>
             <a:r>
               <a:rPr lang="en-GB" dirty="0"/>
-              <a:t>pp03.ppy: Return some useful data using HTML</a:t>
+              <a:t>pp03.py: Return some useful data using HTML</a:t>
             </a:r>
           </a:p>
         </p:txBody>
@@ -5225,7 +5295,7 @@
           <a:p>
             <a:r>
               <a:rPr lang="en-GB" dirty="0"/>
-              <a:t>pp04.ppy: Use templates for cleaner code</a:t>
+              <a:t>pp04.py: Use templates for cleaner code</a:t>
             </a:r>
           </a:p>
         </p:txBody>
@@ -5812,7 +5882,7 @@
           <a:p>
             <a:r>
               <a:rPr lang="en-GB" dirty="0"/>
-              <a:t>pp05.ppy: Accept user input by using a form </a:t>
+              <a:t>pp05.py: Accept user input by using a form </a:t>
             </a:r>
           </a:p>
         </p:txBody>
@@ -6614,103 +6684,6 @@
     <p:extLst>
       <p:ext uri="{BB962C8B-B14F-4D97-AF65-F5344CB8AC3E}">
         <p14:creationId xmlns:p14="http://schemas.microsoft.com/office/powerpoint/2010/main" val="2442050802"/>
-      </p:ext>
-    </p:extLst>
-  </p:cSld>
-  <p:clrMapOvr>
-    <a:masterClrMapping/>
-  </p:clrMapOvr>
-</p:sld>
-</file>
-
-<file path=ppt/slides/slide9.xml><?xml version="1.0" encoding="utf-8"?>
-<p:sld xmlns:a="http://schemas.openxmlformats.org/drawingml/2006/main" xmlns:r="http://schemas.openxmlformats.org/officeDocument/2006/relationships" xmlns:p="http://schemas.openxmlformats.org/presentationml/2006/main">
-  <p:cSld>
-    <p:spTree>
-      <p:nvGrpSpPr>
-        <p:cNvPr id="1" name=""/>
-        <p:cNvGrpSpPr/>
-        <p:nvPr/>
-      </p:nvGrpSpPr>
-      <p:grpSpPr>
-        <a:xfrm>
-          <a:off x="0" y="0"/>
-          <a:ext cx="0" cy="0"/>
-          <a:chOff x="0" y="0"/>
-          <a:chExt cx="0" cy="0"/>
-        </a:xfrm>
-      </p:grpSpPr>
-      <p:sp>
-        <p:nvSpPr>
-          <p:cNvPr id="2" name="Title 1">
-            <a:extLst>
-              <a:ext uri="{FF2B5EF4-FFF2-40B4-BE49-F238E27FC236}">
-                <a16:creationId xmlns:a16="http://schemas.microsoft.com/office/drawing/2014/main" id="{4C638070-9814-4D3C-B7B8-FD33F6BAF5E4}"/>
-              </a:ext>
-            </a:extLst>
-          </p:cNvPr>
-          <p:cNvSpPr>
-            <a:spLocks noGrp="1"/>
-          </p:cNvSpPr>
-          <p:nvPr>
-            <p:ph type="title"/>
-          </p:nvPr>
-        </p:nvSpPr>
-        <p:spPr/>
-        <p:txBody>
-          <a:bodyPr/>
-          <a:lstStyle/>
-          <a:p>
-            <a:r>
-              <a:rPr lang="en-GB" dirty="0"/>
-              <a:t>Example of Flask in action</a:t>
-            </a:r>
-          </a:p>
-        </p:txBody>
-      </p:sp>
-      <p:sp>
-        <p:nvSpPr>
-          <p:cNvPr id="3" name="Content Placeholder 2">
-            <a:extLst>
-              <a:ext uri="{FF2B5EF4-FFF2-40B4-BE49-F238E27FC236}">
-                <a16:creationId xmlns:a16="http://schemas.microsoft.com/office/drawing/2014/main" id="{156A3EF7-2439-4546-9FE6-40FACA171D65}"/>
-              </a:ext>
-            </a:extLst>
-          </p:cNvPr>
-          <p:cNvSpPr>
-            <a:spLocks noGrp="1"/>
-          </p:cNvSpPr>
-          <p:nvPr>
-            <p:ph idx="1"/>
-          </p:nvPr>
-        </p:nvSpPr>
-        <p:spPr/>
-        <p:txBody>
-          <a:bodyPr>
-            <a:normAutofit/>
-          </a:bodyPr>
-          <a:lstStyle/>
-          <a:p>
-            <a:pPr marL="0" indent="0" algn="ctr">
-              <a:buNone/>
-            </a:pPr>
-            <a:r>
-              <a:rPr lang="en-GB" sz="3200" dirty="0">
-                <a:latin typeface="Consolas" panose="020B0609020204030204" pitchFamily="49" charset="0"/>
-                <a:hlinkClick r:id="rId2"/>
-              </a:rPr>
-              <a:t>pitdb.org</a:t>
-            </a:r>
-            <a:endParaRPr lang="en-GB" sz="3200" dirty="0">
-              <a:latin typeface="Consolas" panose="020B0609020204030204" pitchFamily="49" charset="0"/>
-            </a:endParaRPr>
-          </a:p>
-        </p:txBody>
-      </p:sp>
-    </p:spTree>
-    <p:extLst>
-      <p:ext uri="{BB962C8B-B14F-4D97-AF65-F5344CB8AC3E}">
-        <p14:creationId xmlns:p14="http://schemas.microsoft.com/office/powerpoint/2010/main" val="996041999"/>
       </p:ext>
     </p:extLst>
   </p:cSld>

</xml_diff>

<commit_message>
Fixed PDB link and yet more typos
</commit_message>
<xml_diff>
--- a/explanation.pptx
+++ b/explanation.pptx
@@ -113,14 +113,225 @@
   </p:defaultTextStyle>
   <p:extLst>
     <p:ext uri="{EFAFB233-063F-42B5-8137-9DF3F51BA10A}">
-      <p15:sldGuideLst xmlns:p15="http://schemas.microsoft.com/office/powerpoint/2012/main"/>
+      <p15:sldGuideLst xmlns:p15="http://schemas.microsoft.com/office/powerpoint/2012/main">
+        <p15:guide id="1" orient="horz" pos="96" userDrawn="1">
+          <p15:clr>
+            <a:srgbClr val="A4A3A4"/>
+          </p15:clr>
+        </p15:guide>
+        <p15:guide id="2" pos="121" userDrawn="1">
+          <p15:clr>
+            <a:srgbClr val="A4A3A4"/>
+          </p15:clr>
+        </p15:guide>
+      </p15:sldGuideLst>
     </p:ext>
   </p:extLst>
 </p:presentation>
 </file>
 
+<file path=ppt/revisionInfo.xml><?xml version="1.0" encoding="utf-8"?>
+<p1510:revInfo xmlns:a="http://schemas.openxmlformats.org/drawingml/2006/main" xmlns:r="http://schemas.openxmlformats.org/officeDocument/2006/relationships" xmlns:p1510="http://schemas.microsoft.com/office/powerpoint/2015/10/main">
+  <p1510:revLst>
+    <p1510:client id="{45C736B0-E62C-49A4-89B8-9995289BD366}" v="5" dt="2021-01-18T09:06:23.071"/>
+  </p1510:revLst>
+</p1510:revInfo>
+</file>
+
 <file path=ppt/changesInfos/changesInfo1.xml><?xml version="1.0" encoding="utf-8"?>
 <pc:chgInfo xmlns:a="http://schemas.openxmlformats.org/drawingml/2006/main" xmlns:r="http://schemas.openxmlformats.org/officeDocument/2006/relationships" xmlns:ac="http://schemas.microsoft.com/office/drawing/2013/main/command" xmlns:pc="http://schemas.microsoft.com/office/powerpoint/2013/main/command">
+  <pc:docChgLst>
+    <pc:chgData name="Conrad Bessant" userId="d4e3a46bc100e212" providerId="LiveId" clId="{45C736B0-E62C-49A4-89B8-9995289BD366}"/>
+    <pc:docChg chg="undo redo custSel modSld modMainMaster modShowInfo">
+      <pc:chgData name="Conrad Bessant" userId="d4e3a46bc100e212" providerId="LiveId" clId="{45C736B0-E62C-49A4-89B8-9995289BD366}" dt="2021-01-18T09:06:32.834" v="177" actId="1076"/>
+      <pc:docMkLst>
+        <pc:docMk/>
+      </pc:docMkLst>
+      <pc:sldChg chg="modSp mod">
+        <pc:chgData name="Conrad Bessant" userId="d4e3a46bc100e212" providerId="LiveId" clId="{45C736B0-E62C-49A4-89B8-9995289BD366}" dt="2021-01-17T20:57:33.049" v="172" actId="20577"/>
+        <pc:sldMkLst>
+          <pc:docMk/>
+          <pc:sldMk cId="2777446783" sldId="256"/>
+        </pc:sldMkLst>
+        <pc:spChg chg="mod">
+          <ac:chgData name="Conrad Bessant" userId="d4e3a46bc100e212" providerId="LiveId" clId="{45C736B0-E62C-49A4-89B8-9995289BD366}" dt="2021-01-17T18:23:54.350" v="5" actId="404"/>
+          <ac:spMkLst>
+            <pc:docMk/>
+            <pc:sldMk cId="2777446783" sldId="256"/>
+            <ac:spMk id="2" creationId="{B18DBF75-0C02-4AD2-AA46-BBBCEECDF36A}"/>
+          </ac:spMkLst>
+        </pc:spChg>
+        <pc:spChg chg="mod">
+          <ac:chgData name="Conrad Bessant" userId="d4e3a46bc100e212" providerId="LiveId" clId="{45C736B0-E62C-49A4-89B8-9995289BD366}" dt="2021-01-17T20:57:33.049" v="172" actId="20577"/>
+          <ac:spMkLst>
+            <pc:docMk/>
+            <pc:sldMk cId="2777446783" sldId="256"/>
+            <ac:spMk id="3" creationId="{23A0DEA6-D15E-4029-AD58-A2BCF32425D3}"/>
+          </ac:spMkLst>
+        </pc:spChg>
+      </pc:sldChg>
+      <pc:sldChg chg="modSp mod">
+        <pc:chgData name="Conrad Bessant" userId="d4e3a46bc100e212" providerId="LiveId" clId="{45C736B0-E62C-49A4-89B8-9995289BD366}" dt="2021-01-17T18:29:10.631" v="40" actId="14100"/>
+        <pc:sldMkLst>
+          <pc:docMk/>
+          <pc:sldMk cId="3668064913" sldId="257"/>
+        </pc:sldMkLst>
+        <pc:spChg chg="mod">
+          <ac:chgData name="Conrad Bessant" userId="d4e3a46bc100e212" providerId="LiveId" clId="{45C736B0-E62C-49A4-89B8-9995289BD366}" dt="2021-01-17T18:29:10.631" v="40" actId="14100"/>
+          <ac:spMkLst>
+            <pc:docMk/>
+            <pc:sldMk cId="3668064913" sldId="257"/>
+            <ac:spMk id="2" creationId="{37ED8E29-5C26-4256-9E62-D456FF183713}"/>
+          </ac:spMkLst>
+        </pc:spChg>
+      </pc:sldChg>
+      <pc:sldChg chg="modSp mod">
+        <pc:chgData name="Conrad Bessant" userId="d4e3a46bc100e212" providerId="LiveId" clId="{45C736B0-E62C-49A4-89B8-9995289BD366}" dt="2021-01-17T20:47:07.037" v="143" actId="20577"/>
+        <pc:sldMkLst>
+          <pc:docMk/>
+          <pc:sldMk cId="917768929" sldId="258"/>
+        </pc:sldMkLst>
+        <pc:spChg chg="mod">
+          <ac:chgData name="Conrad Bessant" userId="d4e3a46bc100e212" providerId="LiveId" clId="{45C736B0-E62C-49A4-89B8-9995289BD366}" dt="2021-01-17T20:47:07.037" v="143" actId="20577"/>
+          <ac:spMkLst>
+            <pc:docMk/>
+            <pc:sldMk cId="917768929" sldId="258"/>
+            <ac:spMk id="2" creationId="{FF348AEB-35BF-47FF-960D-01A0AFE995B0}"/>
+          </ac:spMkLst>
+        </pc:spChg>
+        <pc:spChg chg="mod">
+          <ac:chgData name="Conrad Bessant" userId="d4e3a46bc100e212" providerId="LiveId" clId="{45C736B0-E62C-49A4-89B8-9995289BD366}" dt="2021-01-17T18:33:24.398" v="103" actId="20577"/>
+          <ac:spMkLst>
+            <pc:docMk/>
+            <pc:sldMk cId="917768929" sldId="258"/>
+            <ac:spMk id="3" creationId="{1F0DA4CC-AAF3-411E-B11C-5A2B25ED3DDE}"/>
+          </ac:spMkLst>
+        </pc:spChg>
+      </pc:sldChg>
+      <pc:sldChg chg="modSp mod">
+        <pc:chgData name="Conrad Bessant" userId="d4e3a46bc100e212" providerId="LiveId" clId="{45C736B0-E62C-49A4-89B8-9995289BD366}" dt="2021-01-17T18:27:43.602" v="22" actId="1076"/>
+        <pc:sldMkLst>
+          <pc:docMk/>
+          <pc:sldMk cId="1432115885" sldId="259"/>
+        </pc:sldMkLst>
+        <pc:spChg chg="mod">
+          <ac:chgData name="Conrad Bessant" userId="d4e3a46bc100e212" providerId="LiveId" clId="{45C736B0-E62C-49A4-89B8-9995289BD366}" dt="2021-01-17T18:27:43.602" v="22" actId="1076"/>
+          <ac:spMkLst>
+            <pc:docMk/>
+            <pc:sldMk cId="1432115885" sldId="259"/>
+            <ac:spMk id="2" creationId="{37ED8E29-5C26-4256-9E62-D456FF183713}"/>
+          </ac:spMkLst>
+        </pc:spChg>
+      </pc:sldChg>
+      <pc:sldChg chg="addSp delSp modSp mod">
+        <pc:chgData name="Conrad Bessant" userId="d4e3a46bc100e212" providerId="LiveId" clId="{45C736B0-E62C-49A4-89B8-9995289BD366}" dt="2021-01-18T09:06:32.834" v="177" actId="1076"/>
+        <pc:sldMkLst>
+          <pc:docMk/>
+          <pc:sldMk cId="2494318239" sldId="260"/>
+        </pc:sldMkLst>
+        <pc:spChg chg="mod">
+          <ac:chgData name="Conrad Bessant" userId="d4e3a46bc100e212" providerId="LiveId" clId="{45C736B0-E62C-49A4-89B8-9995289BD366}" dt="2021-01-17T18:29:18.275" v="41" actId="14100"/>
+          <ac:spMkLst>
+            <pc:docMk/>
+            <pc:sldMk cId="2494318239" sldId="260"/>
+            <ac:spMk id="2" creationId="{AC29381B-6029-4981-94DB-7A458412A022}"/>
+          </ac:spMkLst>
+        </pc:spChg>
+        <pc:spChg chg="del">
+          <ac:chgData name="Conrad Bessant" userId="d4e3a46bc100e212" providerId="LiveId" clId="{45C736B0-E62C-49A4-89B8-9995289BD366}" dt="2021-01-18T09:06:30.567" v="176" actId="478"/>
+          <ac:spMkLst>
+            <pc:docMk/>
+            <pc:sldMk cId="2494318239" sldId="260"/>
+            <ac:spMk id="10" creationId="{9D9D8425-CE23-4DF1-8D8B-F4A9194AE433}"/>
+          </ac:spMkLst>
+        </pc:spChg>
+        <pc:spChg chg="add mod">
+          <ac:chgData name="Conrad Bessant" userId="d4e3a46bc100e212" providerId="LiveId" clId="{45C736B0-E62C-49A4-89B8-9995289BD366}" dt="2021-01-18T09:06:32.834" v="177" actId="1076"/>
+          <ac:spMkLst>
+            <pc:docMk/>
+            <pc:sldMk cId="2494318239" sldId="260"/>
+            <ac:spMk id="14" creationId="{87019C5A-3176-4153-A7CF-50F3CE1CCA03}"/>
+          </ac:spMkLst>
+        </pc:spChg>
+      </pc:sldChg>
+      <pc:sldChg chg="modSp mod">
+        <pc:chgData name="Conrad Bessant" userId="d4e3a46bc100e212" providerId="LiveId" clId="{45C736B0-E62C-49A4-89B8-9995289BD366}" dt="2021-01-17T18:28:23.664" v="29" actId="1076"/>
+        <pc:sldMkLst>
+          <pc:docMk/>
+          <pc:sldMk cId="1568756276" sldId="261"/>
+        </pc:sldMkLst>
+        <pc:spChg chg="mod">
+          <ac:chgData name="Conrad Bessant" userId="d4e3a46bc100e212" providerId="LiveId" clId="{45C736B0-E62C-49A4-89B8-9995289BD366}" dt="2021-01-17T18:28:23.664" v="29" actId="1076"/>
+          <ac:spMkLst>
+            <pc:docMk/>
+            <pc:sldMk cId="1568756276" sldId="261"/>
+            <ac:spMk id="2" creationId="{AC29381B-6029-4981-94DB-7A458412A022}"/>
+          </ac:spMkLst>
+        </pc:spChg>
+      </pc:sldChg>
+      <pc:sldChg chg="modSp mod">
+        <pc:chgData name="Conrad Bessant" userId="d4e3a46bc100e212" providerId="LiveId" clId="{45C736B0-E62C-49A4-89B8-9995289BD366}" dt="2021-01-17T18:31:56.981" v="66" actId="20577"/>
+        <pc:sldMkLst>
+          <pc:docMk/>
+          <pc:sldMk cId="1532459044" sldId="262"/>
+        </pc:sldMkLst>
+        <pc:spChg chg="mod">
+          <ac:chgData name="Conrad Bessant" userId="d4e3a46bc100e212" providerId="LiveId" clId="{45C736B0-E62C-49A4-89B8-9995289BD366}" dt="2021-01-17T18:31:56.981" v="66" actId="20577"/>
+          <ac:spMkLst>
+            <pc:docMk/>
+            <pc:sldMk cId="1532459044" sldId="262"/>
+            <ac:spMk id="2" creationId="{AC29381B-6029-4981-94DB-7A458412A022}"/>
+          </ac:spMkLst>
+        </pc:spChg>
+      </pc:sldChg>
+      <pc:sldChg chg="modSp mod">
+        <pc:chgData name="Conrad Bessant" userId="d4e3a46bc100e212" providerId="LiveId" clId="{45C736B0-E62C-49A4-89B8-9995289BD366}" dt="2021-01-17T18:32:04.505" v="68" actId="27636"/>
+        <pc:sldMkLst>
+          <pc:docMk/>
+          <pc:sldMk cId="2442050802" sldId="263"/>
+        </pc:sldMkLst>
+        <pc:spChg chg="mod">
+          <ac:chgData name="Conrad Bessant" userId="d4e3a46bc100e212" providerId="LiveId" clId="{45C736B0-E62C-49A4-89B8-9995289BD366}" dt="2021-01-17T18:28:45.443" v="35" actId="14100"/>
+          <ac:spMkLst>
+            <pc:docMk/>
+            <pc:sldMk cId="2442050802" sldId="263"/>
+            <ac:spMk id="2" creationId="{BA748991-DE37-4431-A688-97DAC25058D9}"/>
+          </ac:spMkLst>
+        </pc:spChg>
+        <pc:spChg chg="mod">
+          <ac:chgData name="Conrad Bessant" userId="d4e3a46bc100e212" providerId="LiveId" clId="{45C736B0-E62C-49A4-89B8-9995289BD366}" dt="2021-01-17T18:32:04.505" v="68" actId="27636"/>
+          <ac:spMkLst>
+            <pc:docMk/>
+            <pc:sldMk cId="2442050802" sldId="263"/>
+            <ac:spMk id="3" creationId="{0736B900-CE3E-4C70-9071-86112A6ECD98}"/>
+          </ac:spMkLst>
+        </pc:spChg>
+      </pc:sldChg>
+      <pc:sldMasterChg chg="modSp mod">
+        <pc:chgData name="Conrad Bessant" userId="d4e3a46bc100e212" providerId="LiveId" clId="{45C736B0-E62C-49A4-89B8-9995289BD366}" dt="2021-01-17T18:32:28.982" v="69" actId="2711"/>
+        <pc:sldMasterMkLst>
+          <pc:docMk/>
+          <pc:sldMasterMk cId="1128448875" sldId="2147483648"/>
+        </pc:sldMasterMkLst>
+        <pc:spChg chg="mod">
+          <ac:chgData name="Conrad Bessant" userId="d4e3a46bc100e212" providerId="LiveId" clId="{45C736B0-E62C-49A4-89B8-9995289BD366}" dt="2021-01-17T18:25:23.322" v="10" actId="1076"/>
+          <ac:spMkLst>
+            <pc:docMk/>
+            <pc:sldMasterMk cId="1128448875" sldId="2147483648"/>
+            <ac:spMk id="2" creationId="{527D3D44-FC8C-4432-A47B-AAAECE6BA063}"/>
+          </ac:spMkLst>
+        </pc:spChg>
+        <pc:spChg chg="mod">
+          <ac:chgData name="Conrad Bessant" userId="d4e3a46bc100e212" providerId="LiveId" clId="{45C736B0-E62C-49A4-89B8-9995289BD366}" dt="2021-01-17T18:32:28.982" v="69" actId="2711"/>
+          <ac:spMkLst>
+            <pc:docMk/>
+            <pc:sldMasterMk cId="1128448875" sldId="2147483648"/>
+            <ac:spMk id="3" creationId="{F356FF90-E124-4438-9C43-AB7127B215D9}"/>
+          </ac:spMkLst>
+        </pc:spChg>
+      </pc:sldMasterChg>
+    </pc:docChg>
+  </pc:docChgLst>
   <pc:docChgLst>
     <pc:chgData name="Conrad Bessant" userId="d4e3a46bc100e212" providerId="LiveId" clId="{4D90BB7C-8E2F-41F3-8217-EAAEC5D501B3}"/>
     <pc:docChg chg="custSel modSld">
@@ -159,9 +370,6 @@
         </pc:spChg>
       </pc:sldChg>
     </pc:docChg>
-  </pc:docChgLst>
-  <pc:docChgLst>
-    <pc:chgData name="Conrad Bessant" userId="d4e3a46bc100e212" providerId="LiveId" clId="{15D4631F-D760-4ADF-939B-954E88C3F303}"/>
   </pc:docChgLst>
   <pc:docChgLst>
     <pc:chgData name="Conrad Bessant" userId="d4e3a46bc100e212" providerId="LiveId" clId="{30EED129-B497-4BCB-8DFB-6682A2B706B8}"/>
@@ -376,7 +584,7 @@
           <a:p>
             <a:fld id="{349C7AD5-8D17-4F45-9111-E5C09C8627AF}" type="datetimeFigureOut">
               <a:rPr lang="en-GB" smtClean="0"/>
-              <a:t>06/01/2020</a:t>
+              <a:t>18/01/2021</a:t>
             </a:fld>
             <a:endParaRPr lang="en-GB"/>
           </a:p>
@@ -576,7 +784,7 @@
           <a:p>
             <a:fld id="{349C7AD5-8D17-4F45-9111-E5C09C8627AF}" type="datetimeFigureOut">
               <a:rPr lang="en-GB" smtClean="0"/>
-              <a:t>06/01/2020</a:t>
+              <a:t>18/01/2021</a:t>
             </a:fld>
             <a:endParaRPr lang="en-GB"/>
           </a:p>
@@ -786,7 +994,7 @@
           <a:p>
             <a:fld id="{349C7AD5-8D17-4F45-9111-E5C09C8627AF}" type="datetimeFigureOut">
               <a:rPr lang="en-GB" smtClean="0"/>
-              <a:t>06/01/2020</a:t>
+              <a:t>18/01/2021</a:t>
             </a:fld>
             <a:endParaRPr lang="en-GB"/>
           </a:p>
@@ -986,7 +1194,7 @@
           <a:p>
             <a:fld id="{349C7AD5-8D17-4F45-9111-E5C09C8627AF}" type="datetimeFigureOut">
               <a:rPr lang="en-GB" smtClean="0"/>
-              <a:t>06/01/2020</a:t>
+              <a:t>18/01/2021</a:t>
             </a:fld>
             <a:endParaRPr lang="en-GB"/>
           </a:p>
@@ -1262,7 +1470,7 @@
           <a:p>
             <a:fld id="{349C7AD5-8D17-4F45-9111-E5C09C8627AF}" type="datetimeFigureOut">
               <a:rPr lang="en-GB" smtClean="0"/>
-              <a:t>06/01/2020</a:t>
+              <a:t>18/01/2021</a:t>
             </a:fld>
             <a:endParaRPr lang="en-GB"/>
           </a:p>
@@ -1530,7 +1738,7 @@
           <a:p>
             <a:fld id="{349C7AD5-8D17-4F45-9111-E5C09C8627AF}" type="datetimeFigureOut">
               <a:rPr lang="en-GB" smtClean="0"/>
-              <a:t>06/01/2020</a:t>
+              <a:t>18/01/2021</a:t>
             </a:fld>
             <a:endParaRPr lang="en-GB"/>
           </a:p>
@@ -1945,7 +2153,7 @@
           <a:p>
             <a:fld id="{349C7AD5-8D17-4F45-9111-E5C09C8627AF}" type="datetimeFigureOut">
               <a:rPr lang="en-GB" smtClean="0"/>
-              <a:t>06/01/2020</a:t>
+              <a:t>18/01/2021</a:t>
             </a:fld>
             <a:endParaRPr lang="en-GB"/>
           </a:p>
@@ -2087,7 +2295,7 @@
           <a:p>
             <a:fld id="{349C7AD5-8D17-4F45-9111-E5C09C8627AF}" type="datetimeFigureOut">
               <a:rPr lang="en-GB" smtClean="0"/>
-              <a:t>06/01/2020</a:t>
+              <a:t>18/01/2021</a:t>
             </a:fld>
             <a:endParaRPr lang="en-GB"/>
           </a:p>
@@ -2200,7 +2408,7 @@
           <a:p>
             <a:fld id="{349C7AD5-8D17-4F45-9111-E5C09C8627AF}" type="datetimeFigureOut">
               <a:rPr lang="en-GB" smtClean="0"/>
-              <a:t>06/01/2020</a:t>
+              <a:t>18/01/2021</a:t>
             </a:fld>
             <a:endParaRPr lang="en-GB"/>
           </a:p>
@@ -2513,7 +2721,7 @@
           <a:p>
             <a:fld id="{349C7AD5-8D17-4F45-9111-E5C09C8627AF}" type="datetimeFigureOut">
               <a:rPr lang="en-GB" smtClean="0"/>
-              <a:t>06/01/2020</a:t>
+              <a:t>18/01/2021</a:t>
             </a:fld>
             <a:endParaRPr lang="en-GB"/>
           </a:p>
@@ -2802,7 +3010,7 @@
           <a:p>
             <a:fld id="{349C7AD5-8D17-4F45-9111-E5C09C8627AF}" type="datetimeFigureOut">
               <a:rPr lang="en-GB" smtClean="0"/>
-              <a:t>06/01/2020</a:t>
+              <a:t>18/01/2021</a:t>
             </a:fld>
             <a:endParaRPr lang="en-GB"/>
           </a:p>
@@ -2915,24 +3123,24 @@
         </p:nvSpPr>
         <p:spPr>
           <a:xfrm>
-            <a:off x="838200" y="365125"/>
-            <a:ext cx="10515600" cy="1325563"/>
+            <a:off x="140110" y="136525"/>
+            <a:ext cx="10515600" cy="664536"/>
           </a:xfrm>
           <a:prstGeom prst="rect">
             <a:avLst/>
           </a:prstGeom>
         </p:spPr>
         <p:txBody>
-          <a:bodyPr vert="horz" lIns="91440" tIns="45720" rIns="91440" bIns="45720" rtlCol="0" anchor="ctr">
+          <a:bodyPr vert="horz" lIns="91440" tIns="45720" rIns="91440" bIns="45720" rtlCol="0" anchor="t" anchorCtr="0">
             <a:normAutofit/>
           </a:bodyPr>
           <a:lstStyle/>
           <a:p>
             <a:r>
-              <a:rPr lang="en-US"/>
+              <a:rPr lang="en-US" dirty="0"/>
               <a:t>Click to edit Master title style</a:t>
             </a:r>
-            <a:endParaRPr lang="en-GB"/>
+            <a:endParaRPr lang="en-GB" dirty="0"/>
           </a:p>
         </p:txBody>
       </p:sp>
@@ -3045,7 +3253,7 @@
           <a:p>
             <a:fld id="{349C7AD5-8D17-4F45-9111-E5C09C8627AF}" type="datetimeFigureOut">
               <a:rPr lang="en-GB" smtClean="0"/>
-              <a:t>06/01/2020</a:t>
+              <a:t>18/01/2021</a:t>
             </a:fld>
             <a:endParaRPr lang="en-GB"/>
           </a:p>
@@ -3172,11 +3380,11 @@
           <a:spcPct val="0"/>
         </a:spcBef>
         <a:buNone/>
-        <a:defRPr sz="4400" kern="1200">
+        <a:defRPr sz="3600" kern="1200" cap="all" baseline="0">
           <a:solidFill>
-            <a:schemeClr val="tx1"/>
+            <a:schemeClr val="tx2"/>
           </a:solidFill>
-          <a:latin typeface="+mj-lt"/>
+          <a:latin typeface="Arial Black" panose="020B0A04020102020204" pitchFamily="34" charset="0"/>
           <a:ea typeface="+mj-ea"/>
           <a:cs typeface="+mj-cs"/>
         </a:defRPr>
@@ -3196,9 +3404,9 @@
           <a:solidFill>
             <a:schemeClr val="tx1"/>
           </a:solidFill>
-          <a:latin typeface="+mn-lt"/>
+          <a:latin typeface="Arial" panose="020B0604020202020204" pitchFamily="34" charset="0"/>
           <a:ea typeface="+mn-ea"/>
-          <a:cs typeface="+mn-cs"/>
+          <a:cs typeface="Arial" panose="020B0604020202020204" pitchFamily="34" charset="0"/>
         </a:defRPr>
       </a:lvl1pPr>
       <a:lvl2pPr marL="685800" indent="-228600" algn="l" defTabSz="914400" rtl="0" eaLnBrk="1" latinLnBrk="0" hangingPunct="1">
@@ -3214,9 +3422,9 @@
           <a:solidFill>
             <a:schemeClr val="tx1"/>
           </a:solidFill>
-          <a:latin typeface="+mn-lt"/>
+          <a:latin typeface="Arial" panose="020B0604020202020204" pitchFamily="34" charset="0"/>
           <a:ea typeface="+mn-ea"/>
-          <a:cs typeface="+mn-cs"/>
+          <a:cs typeface="Arial" panose="020B0604020202020204" pitchFamily="34" charset="0"/>
         </a:defRPr>
       </a:lvl2pPr>
       <a:lvl3pPr marL="1143000" indent="-228600" algn="l" defTabSz="914400" rtl="0" eaLnBrk="1" latinLnBrk="0" hangingPunct="1">
@@ -3232,9 +3440,9 @@
           <a:solidFill>
             <a:schemeClr val="tx1"/>
           </a:solidFill>
-          <a:latin typeface="+mn-lt"/>
+          <a:latin typeface="Arial" panose="020B0604020202020204" pitchFamily="34" charset="0"/>
           <a:ea typeface="+mn-ea"/>
-          <a:cs typeface="+mn-cs"/>
+          <a:cs typeface="Arial" panose="020B0604020202020204" pitchFamily="34" charset="0"/>
         </a:defRPr>
       </a:lvl3pPr>
       <a:lvl4pPr marL="1600200" indent="-228600" algn="l" defTabSz="914400" rtl="0" eaLnBrk="1" latinLnBrk="0" hangingPunct="1">
@@ -3250,9 +3458,9 @@
           <a:solidFill>
             <a:schemeClr val="tx1"/>
           </a:solidFill>
-          <a:latin typeface="+mn-lt"/>
+          <a:latin typeface="Arial" panose="020B0604020202020204" pitchFamily="34" charset="0"/>
           <a:ea typeface="+mn-ea"/>
-          <a:cs typeface="+mn-cs"/>
+          <a:cs typeface="Arial" panose="020B0604020202020204" pitchFamily="34" charset="0"/>
         </a:defRPr>
       </a:lvl4pPr>
       <a:lvl5pPr marL="2057400" indent="-228600" algn="l" defTabSz="914400" rtl="0" eaLnBrk="1" latinLnBrk="0" hangingPunct="1">
@@ -3268,9 +3476,9 @@
           <a:solidFill>
             <a:schemeClr val="tx1"/>
           </a:solidFill>
-          <a:latin typeface="+mn-lt"/>
+          <a:latin typeface="Arial" panose="020B0604020202020204" pitchFamily="34" charset="0"/>
           <a:ea typeface="+mn-ea"/>
-          <a:cs typeface="+mn-cs"/>
+          <a:cs typeface="Arial" panose="020B0604020202020204" pitchFamily="34" charset="0"/>
         </a:defRPr>
       </a:lvl5pPr>
       <a:lvl6pPr marL="2514600" indent="-228600" algn="l" defTabSz="914400" rtl="0" eaLnBrk="1" latinLnBrk="0" hangingPunct="1">
@@ -3480,40 +3688,54 @@
         </p:nvSpPr>
         <p:spPr/>
         <p:txBody>
+          <a:bodyPr>
+            <a:normAutofit/>
+          </a:bodyPr>
+          <a:lstStyle/>
+          <a:p>
+            <a:r>
+              <a:rPr lang="en-GB" sz="3600" dirty="0"/>
+              <a:t>Web Workshop</a:t>
+            </a:r>
+          </a:p>
+        </p:txBody>
+      </p:sp>
+      <p:sp>
+        <p:nvSpPr>
+          <p:cNvPr id="3" name="Subtitle 2">
+            <a:extLst>
+              <a:ext uri="{FF2B5EF4-FFF2-40B4-BE49-F238E27FC236}">
+                <a16:creationId xmlns:a16="http://schemas.microsoft.com/office/drawing/2014/main" id="{23A0DEA6-D15E-4029-AD58-A2BCF32425D3}"/>
+              </a:ext>
+            </a:extLst>
+          </p:cNvPr>
+          <p:cNvSpPr>
+            <a:spLocks noGrp="1"/>
+          </p:cNvSpPr>
+          <p:nvPr>
+            <p:ph type="subTitle" idx="1"/>
+          </p:nvPr>
+        </p:nvSpPr>
+        <p:spPr/>
+        <p:txBody>
           <a:bodyPr/>
           <a:lstStyle/>
           <a:p>
             <a:r>
               <a:rPr lang="en-GB" dirty="0"/>
-              <a:t>Web Workshop</a:t>
-            </a:r>
-          </a:p>
-        </p:txBody>
-      </p:sp>
-      <p:sp>
-        <p:nvSpPr>
-          <p:cNvPr id="3" name="Subtitle 2">
-            <a:extLst>
-              <a:ext uri="{FF2B5EF4-FFF2-40B4-BE49-F238E27FC236}">
-                <a16:creationId xmlns:a16="http://schemas.microsoft.com/office/drawing/2014/main" id="{23A0DEA6-D15E-4029-AD58-A2BCF32425D3}"/>
-              </a:ext>
-            </a:extLst>
-          </p:cNvPr>
-          <p:cNvSpPr>
-            <a:spLocks noGrp="1"/>
-          </p:cNvSpPr>
-          <p:nvPr>
-            <p:ph type="subTitle" idx="1"/>
-          </p:nvPr>
-        </p:nvSpPr>
-        <p:spPr/>
-        <p:txBody>
-          <a:bodyPr/>
-          <a:lstStyle/>
+              <a:t>An introduction to web development concepts using Python Flask</a:t>
+            </a:r>
+          </a:p>
           <a:p>
             <a:r>
               <a:rPr lang="en-GB" dirty="0"/>
-              <a:t>An introduction to key web development concepts using Python Flask</a:t>
+              <a:t>by</a:t>
+            </a:r>
+          </a:p>
+          <a:p>
+            <a:r>
+              <a:rPr lang="en-GB" dirty="0"/>
+              <a:t>Conrad Bessant</a:t>
             </a:r>
           </a:p>
         </p:txBody>
@@ -3564,6 +3786,39 @@
             <p:ph type="title"/>
           </p:nvPr>
         </p:nvSpPr>
+        <p:spPr>
+          <a:xfrm>
+            <a:off x="192088" y="152400"/>
+            <a:ext cx="10515600" cy="664536"/>
+          </a:xfrm>
+        </p:spPr>
+        <p:txBody>
+          <a:bodyPr/>
+          <a:lstStyle/>
+          <a:p>
+            <a:r>
+              <a:rPr lang="en-GB" dirty="0"/>
+              <a:t>ABOUT THIS WORKSHOP</a:t>
+            </a:r>
+          </a:p>
+        </p:txBody>
+      </p:sp>
+      <p:sp>
+        <p:nvSpPr>
+          <p:cNvPr id="3" name="Content Placeholder 2">
+            <a:extLst>
+              <a:ext uri="{FF2B5EF4-FFF2-40B4-BE49-F238E27FC236}">
+                <a16:creationId xmlns:a16="http://schemas.microsoft.com/office/drawing/2014/main" id="{1F0DA4CC-AAF3-411E-B11C-5A2B25ED3DDE}"/>
+              </a:ext>
+            </a:extLst>
+          </p:cNvPr>
+          <p:cNvSpPr>
+            <a:spLocks noGrp="1"/>
+          </p:cNvSpPr>
+          <p:nvPr>
+            <p:ph idx="1"/>
+          </p:nvPr>
+        </p:nvSpPr>
         <p:spPr/>
         <p:txBody>
           <a:bodyPr/>
@@ -3571,35 +3826,7 @@
           <a:p>
             <a:r>
               <a:rPr lang="en-GB" dirty="0"/>
-              <a:t>Software specification</a:t>
-            </a:r>
-          </a:p>
-        </p:txBody>
-      </p:sp>
-      <p:sp>
-        <p:nvSpPr>
-          <p:cNvPr id="3" name="Content Placeholder 2">
-            <a:extLst>
-              <a:ext uri="{FF2B5EF4-FFF2-40B4-BE49-F238E27FC236}">
-                <a16:creationId xmlns:a16="http://schemas.microsoft.com/office/drawing/2014/main" id="{1F0DA4CC-AAF3-411E-B11C-5A2B25ED3DDE}"/>
-              </a:ext>
-            </a:extLst>
-          </p:cNvPr>
-          <p:cNvSpPr>
-            <a:spLocks noGrp="1"/>
-          </p:cNvSpPr>
-          <p:nvPr>
-            <p:ph idx="1"/>
-          </p:nvPr>
-        </p:nvSpPr>
-        <p:spPr/>
-        <p:txBody>
-          <a:bodyPr/>
-          <a:lstStyle/>
-          <a:p>
-            <a:r>
-              <a:rPr lang="en-GB" dirty="0"/>
-              <a:t>Today we’re going to build a web based portal for exploring basic information about proteins.</a:t>
+              <a:t>Today we’re going to build a web-based portal for exploring basic information about proteins.</a:t>
             </a:r>
           </a:p>
           <a:p>
@@ -3691,12 +3918,14 @@
         </p:nvSpPr>
         <p:spPr>
           <a:xfrm>
-            <a:off x="838200" y="409729"/>
-            <a:ext cx="10515600" cy="1325563"/>
-          </a:xfrm>
-        </p:spPr>
-        <p:txBody>
-          <a:bodyPr/>
+            <a:off x="192088" y="174876"/>
+            <a:ext cx="10515600" cy="712864"/>
+          </a:xfrm>
+        </p:spPr>
+        <p:txBody>
+          <a:bodyPr>
+            <a:normAutofit/>
+          </a:bodyPr>
           <a:lstStyle/>
           <a:p>
             <a:r>
@@ -4350,8 +4579,8 @@
         </p:nvSpPr>
         <p:spPr>
           <a:xfrm>
-            <a:off x="838200" y="412843"/>
-            <a:ext cx="10515600" cy="1325563"/>
+            <a:off x="192088" y="161491"/>
+            <a:ext cx="10515600" cy="708034"/>
           </a:xfrm>
         </p:spPr>
         <p:txBody>
@@ -4757,8 +4986,8 @@
         </p:nvSpPr>
         <p:spPr>
           <a:xfrm>
-            <a:off x="838200" y="365125"/>
-            <a:ext cx="10881732" cy="1325563"/>
+            <a:off x="192088" y="170923"/>
+            <a:ext cx="10881732" cy="1152718"/>
           </a:xfrm>
         </p:spPr>
         <p:txBody>
@@ -4767,7 +4996,14 @@
           <a:p>
             <a:r>
               <a:rPr lang="en-GB" dirty="0"/>
-              <a:t>pp03.py: Return some useful data using HTML</a:t>
+              <a:t>pp03.py: Return some</a:t>
+            </a:r>
+            <a:br>
+              <a:rPr lang="en-GB" dirty="0"/>
+            </a:br>
+            <a:r>
+              <a:rPr lang="en-GB" dirty="0"/>
+              <a:t>useful data using HTML</a:t>
             </a:r>
           </a:p>
         </p:txBody>
@@ -5009,10 +5245,147 @@
       </p:grpSp>
       <p:sp>
         <p:nvSpPr>
-          <p:cNvPr id="10" name="Arrow: Up-Down 9">
-            <a:extLst>
-              <a:ext uri="{FF2B5EF4-FFF2-40B4-BE49-F238E27FC236}">
-                <a16:creationId xmlns:a16="http://schemas.microsoft.com/office/drawing/2014/main" id="{9D9D8425-CE23-4DF1-8D8B-F4A9194AE433}"/>
+          <p:cNvPr id="11" name="TextBox 10">
+            <a:extLst>
+              <a:ext uri="{FF2B5EF4-FFF2-40B4-BE49-F238E27FC236}">
+                <a16:creationId xmlns:a16="http://schemas.microsoft.com/office/drawing/2014/main" id="{CE158F96-63D6-4865-8134-D373F89099A9}"/>
+              </a:ext>
+            </a:extLst>
+          </p:cNvPr>
+          <p:cNvSpPr txBox="1"/>
+          <p:nvPr/>
+        </p:nvSpPr>
+        <p:spPr>
+          <a:xfrm>
+            <a:off x="7660741" y="4749528"/>
+            <a:ext cx="2497872" cy="646331"/>
+          </a:xfrm>
+          <a:prstGeom prst="rect">
+            <a:avLst/>
+          </a:prstGeom>
+          <a:noFill/>
+          <a:ln>
+            <a:solidFill>
+              <a:schemeClr val="accent1"/>
+            </a:solidFill>
+          </a:ln>
+        </p:spPr>
+        <p:txBody>
+          <a:bodyPr wrap="square" rtlCol="0">
+            <a:spAutoFit/>
+          </a:bodyPr>
+          <a:lstStyle/>
+          <a:p>
+            <a:pPr algn="ctr"/>
+            <a:r>
+              <a:rPr lang="en-GB" dirty="0"/>
+              <a:t>Protein information in </a:t>
+            </a:r>
+            <a:r>
+              <a:rPr lang="en-GB" dirty="0" err="1">
+                <a:latin typeface="Consolas" panose="020B0609020204030204" pitchFamily="49" charset="0"/>
+              </a:rPr>
+              <a:t>protein_table.tsv</a:t>
+            </a:r>
+            <a:endParaRPr lang="en-GB" dirty="0">
+              <a:latin typeface="Consolas" panose="020B0609020204030204" pitchFamily="49" charset="0"/>
+            </a:endParaRPr>
+          </a:p>
+        </p:txBody>
+      </p:sp>
+      <p:sp>
+        <p:nvSpPr>
+          <p:cNvPr id="12" name="TextBox 11">
+            <a:extLst>
+              <a:ext uri="{FF2B5EF4-FFF2-40B4-BE49-F238E27FC236}">
+                <a16:creationId xmlns:a16="http://schemas.microsoft.com/office/drawing/2014/main" id="{1D2A0EA9-31B1-4016-B58B-2634F4A6E674}"/>
+              </a:ext>
+            </a:extLst>
+          </p:cNvPr>
+          <p:cNvSpPr txBox="1"/>
+          <p:nvPr/>
+        </p:nvSpPr>
+        <p:spPr>
+          <a:xfrm>
+            <a:off x="9010185" y="2929366"/>
+            <a:ext cx="2709747" cy="923330"/>
+          </a:xfrm>
+          <a:prstGeom prst="rect">
+            <a:avLst/>
+          </a:prstGeom>
+          <a:noFill/>
+        </p:spPr>
+        <p:txBody>
+          <a:bodyPr wrap="square" rtlCol="0">
+            <a:spAutoFit/>
+          </a:bodyPr>
+          <a:lstStyle/>
+          <a:p>
+            <a:r>
+              <a:rPr lang="en-GB" dirty="0"/>
+              <a:t>For simplicity, we </a:t>
+            </a:r>
+            <a:r>
+              <a:rPr lang="en-GB"/>
+              <a:t>use Pandas </a:t>
+            </a:r>
+            <a:r>
+              <a:rPr lang="en-GB" dirty="0"/>
+              <a:t>to retrieve data from the table.</a:t>
+            </a:r>
+          </a:p>
+        </p:txBody>
+      </p:sp>
+      <p:sp>
+        <p:nvSpPr>
+          <p:cNvPr id="15" name="TextBox 14">
+            <a:extLst>
+              <a:ext uri="{FF2B5EF4-FFF2-40B4-BE49-F238E27FC236}">
+                <a16:creationId xmlns:a16="http://schemas.microsoft.com/office/drawing/2014/main" id="{8994A854-67E7-4F7B-B80D-8EF0F37B9534}"/>
+              </a:ext>
+            </a:extLst>
+          </p:cNvPr>
+          <p:cNvSpPr txBox="1"/>
+          <p:nvPr/>
+        </p:nvSpPr>
+        <p:spPr>
+          <a:xfrm>
+            <a:off x="793755" y="2927646"/>
+            <a:ext cx="2497872" cy="369332"/>
+          </a:xfrm>
+          <a:prstGeom prst="rect">
+            <a:avLst/>
+          </a:prstGeom>
+          <a:noFill/>
+          <a:ln>
+            <a:solidFill>
+              <a:schemeClr val="accent1"/>
+            </a:solidFill>
+          </a:ln>
+        </p:spPr>
+        <p:txBody>
+          <a:bodyPr wrap="square" rtlCol="0">
+            <a:spAutoFit/>
+          </a:bodyPr>
+          <a:lstStyle/>
+          <a:p>
+            <a:pPr algn="ctr"/>
+            <a:r>
+              <a:rPr lang="en-GB" dirty="0"/>
+              <a:t>Image from PDB server</a:t>
+            </a:r>
+            <a:endParaRPr lang="en-GB" dirty="0">
+              <a:latin typeface="Consolas" panose="020B0609020204030204" pitchFamily="49" charset="0"/>
+            </a:endParaRPr>
+          </a:p>
+        </p:txBody>
+      </p:sp>
+      <p:sp>
+        <p:nvSpPr>
+          <p:cNvPr id="16" name="Arrow: Down 15">
+            <a:extLst>
+              <a:ext uri="{FF2B5EF4-FFF2-40B4-BE49-F238E27FC236}">
+                <a16:creationId xmlns:a16="http://schemas.microsoft.com/office/drawing/2014/main" id="{00BB48C6-9EE4-4C05-BB44-AA771898796C}"/>
               </a:ext>
             </a:extLst>
           </p:cNvPr>
@@ -5020,11 +5393,11 @@
           <p:nvPr/>
         </p:nvSpPr>
         <p:spPr>
-          <a:xfrm rot="5400000">
-            <a:off x="6632042" y="4417561"/>
-            <a:ext cx="747132" cy="1310266"/>
-          </a:xfrm>
-          <a:prstGeom prst="upDownArrow">
+          <a:xfrm rot="16200000">
+            <a:off x="3625214" y="2457179"/>
+            <a:ext cx="646331" cy="1310266"/>
+          </a:xfrm>
+          <a:prstGeom prst="downArrow">
             <a:avLst/>
           </a:prstGeom>
           <a:solidFill>
@@ -5058,147 +5431,10 @@
       </p:sp>
       <p:sp>
         <p:nvSpPr>
-          <p:cNvPr id="11" name="TextBox 10">
-            <a:extLst>
-              <a:ext uri="{FF2B5EF4-FFF2-40B4-BE49-F238E27FC236}">
-                <a16:creationId xmlns:a16="http://schemas.microsoft.com/office/drawing/2014/main" id="{CE158F96-63D6-4865-8134-D373F89099A9}"/>
-              </a:ext>
-            </a:extLst>
-          </p:cNvPr>
-          <p:cNvSpPr txBox="1"/>
-          <p:nvPr/>
-        </p:nvSpPr>
-        <p:spPr>
-          <a:xfrm>
-            <a:off x="7660741" y="4749528"/>
-            <a:ext cx="2497872" cy="646331"/>
-          </a:xfrm>
-          <a:prstGeom prst="rect">
-            <a:avLst/>
-          </a:prstGeom>
-          <a:noFill/>
-          <a:ln>
-            <a:solidFill>
-              <a:schemeClr val="accent1"/>
-            </a:solidFill>
-          </a:ln>
-        </p:spPr>
-        <p:txBody>
-          <a:bodyPr wrap="square" rtlCol="0">
-            <a:spAutoFit/>
-          </a:bodyPr>
-          <a:lstStyle/>
-          <a:p>
-            <a:pPr algn="ctr"/>
-            <a:r>
-              <a:rPr lang="en-GB" dirty="0"/>
-              <a:t>Protein information in </a:t>
-            </a:r>
-            <a:r>
-              <a:rPr lang="en-GB" dirty="0" err="1">
-                <a:latin typeface="Consolas" panose="020B0609020204030204" pitchFamily="49" charset="0"/>
-              </a:rPr>
-              <a:t>protein_table.tsv</a:t>
-            </a:r>
-            <a:endParaRPr lang="en-GB" dirty="0">
-              <a:latin typeface="Consolas" panose="020B0609020204030204" pitchFamily="49" charset="0"/>
-            </a:endParaRPr>
-          </a:p>
-        </p:txBody>
-      </p:sp>
-      <p:sp>
-        <p:nvSpPr>
-          <p:cNvPr id="12" name="TextBox 11">
-            <a:extLst>
-              <a:ext uri="{FF2B5EF4-FFF2-40B4-BE49-F238E27FC236}">
-                <a16:creationId xmlns:a16="http://schemas.microsoft.com/office/drawing/2014/main" id="{1D2A0EA9-31B1-4016-B58B-2634F4A6E674}"/>
-              </a:ext>
-            </a:extLst>
-          </p:cNvPr>
-          <p:cNvSpPr txBox="1"/>
-          <p:nvPr/>
-        </p:nvSpPr>
-        <p:spPr>
-          <a:xfrm>
-            <a:off x="9010185" y="2929366"/>
-            <a:ext cx="2709747" cy="923330"/>
-          </a:xfrm>
-          <a:prstGeom prst="rect">
-            <a:avLst/>
-          </a:prstGeom>
-          <a:noFill/>
-        </p:spPr>
-        <p:txBody>
-          <a:bodyPr wrap="square" rtlCol="0">
-            <a:spAutoFit/>
-          </a:bodyPr>
-          <a:lstStyle/>
-          <a:p>
-            <a:r>
-              <a:rPr lang="en-GB" dirty="0"/>
-              <a:t>For simplicity, we </a:t>
-            </a:r>
-            <a:r>
-              <a:rPr lang="en-GB"/>
-              <a:t>use Pandas </a:t>
-            </a:r>
-            <a:r>
-              <a:rPr lang="en-GB" dirty="0"/>
-              <a:t>to retrieve data from the table.</a:t>
-            </a:r>
-          </a:p>
-        </p:txBody>
-      </p:sp>
-      <p:sp>
-        <p:nvSpPr>
-          <p:cNvPr id="15" name="TextBox 14">
-            <a:extLst>
-              <a:ext uri="{FF2B5EF4-FFF2-40B4-BE49-F238E27FC236}">
-                <a16:creationId xmlns:a16="http://schemas.microsoft.com/office/drawing/2014/main" id="{8994A854-67E7-4F7B-B80D-8EF0F37B9534}"/>
-              </a:ext>
-            </a:extLst>
-          </p:cNvPr>
-          <p:cNvSpPr txBox="1"/>
-          <p:nvPr/>
-        </p:nvSpPr>
-        <p:spPr>
-          <a:xfrm>
-            <a:off x="793755" y="2927646"/>
-            <a:ext cx="2497872" cy="369332"/>
-          </a:xfrm>
-          <a:prstGeom prst="rect">
-            <a:avLst/>
-          </a:prstGeom>
-          <a:noFill/>
-          <a:ln>
-            <a:solidFill>
-              <a:schemeClr val="accent1"/>
-            </a:solidFill>
-          </a:ln>
-        </p:spPr>
-        <p:txBody>
-          <a:bodyPr wrap="square" rtlCol="0">
-            <a:spAutoFit/>
-          </a:bodyPr>
-          <a:lstStyle/>
-          <a:p>
-            <a:pPr algn="ctr"/>
-            <a:r>
-              <a:rPr lang="en-GB" dirty="0"/>
-              <a:t>Image from PDB server</a:t>
-            </a:r>
-            <a:endParaRPr lang="en-GB" dirty="0">
-              <a:latin typeface="Consolas" panose="020B0609020204030204" pitchFamily="49" charset="0"/>
-            </a:endParaRPr>
-          </a:p>
-        </p:txBody>
-      </p:sp>
-      <p:sp>
-        <p:nvSpPr>
-          <p:cNvPr id="16" name="Arrow: Down 15">
-            <a:extLst>
-              <a:ext uri="{FF2B5EF4-FFF2-40B4-BE49-F238E27FC236}">
-                <a16:creationId xmlns:a16="http://schemas.microsoft.com/office/drawing/2014/main" id="{00BB48C6-9EE4-4C05-BB44-AA771898796C}"/>
+          <p:cNvPr id="14" name="Arrow: Down 13">
+            <a:extLst>
+              <a:ext uri="{FF2B5EF4-FFF2-40B4-BE49-F238E27FC236}">
+                <a16:creationId xmlns:a16="http://schemas.microsoft.com/office/drawing/2014/main" id="{87019C5A-3176-4153-A7CF-50F3CE1CCA03}"/>
               </a:ext>
             </a:extLst>
           </p:cNvPr>
@@ -5206,8 +5442,8 @@
           <p:nvPr/>
         </p:nvSpPr>
         <p:spPr>
-          <a:xfrm rot="16200000">
-            <a:off x="3625214" y="2457179"/>
+          <a:xfrm rot="5400000">
+            <a:off x="6682442" y="4417560"/>
             <a:ext cx="646331" cy="1310266"/>
           </a:xfrm>
           <a:prstGeom prst="downArrow">
@@ -5288,9 +5524,16 @@
             <p:ph type="title"/>
           </p:nvPr>
         </p:nvSpPr>
-        <p:spPr/>
-        <p:txBody>
-          <a:bodyPr/>
+        <p:spPr>
+          <a:xfrm>
+            <a:off x="192088" y="182036"/>
+            <a:ext cx="10515600" cy="1192691"/>
+          </a:xfrm>
+        </p:spPr>
+        <p:txBody>
+          <a:bodyPr>
+            <a:normAutofit/>
+          </a:bodyPr>
           <a:lstStyle/>
           <a:p>
             <a:r>
@@ -5875,14 +6118,28 @@
             <p:ph type="title"/>
           </p:nvPr>
         </p:nvSpPr>
-        <p:spPr/>
-        <p:txBody>
-          <a:bodyPr/>
+        <p:spPr>
+          <a:xfrm>
+            <a:off x="192088" y="170545"/>
+            <a:ext cx="10515600" cy="1554618"/>
+          </a:xfrm>
+        </p:spPr>
+        <p:txBody>
+          <a:bodyPr>
+            <a:normAutofit/>
+          </a:bodyPr>
           <a:lstStyle/>
           <a:p>
             <a:r>
               <a:rPr lang="en-GB" dirty="0"/>
-              <a:t>pp05.py: Accept user input by using a form </a:t>
+              <a:t>pp05.py: Accept user input</a:t>
+            </a:r>
+            <a:br>
+              <a:rPr lang="en-GB" dirty="0"/>
+            </a:br>
+            <a:r>
+              <a:rPr lang="en-GB" dirty="0"/>
+              <a:t>by using a form </a:t>
             </a:r>
           </a:p>
         </p:txBody>
@@ -6564,7 +6821,12 @@
             <p:ph type="title"/>
           </p:nvPr>
         </p:nvSpPr>
-        <p:spPr/>
+        <p:spPr>
+          <a:xfrm>
+            <a:off x="192088" y="152400"/>
+            <a:ext cx="10515600" cy="811162"/>
+          </a:xfrm>
+        </p:spPr>
         <p:txBody>
           <a:bodyPr/>
           <a:lstStyle/>
@@ -6594,13 +6856,13 @@
         </p:nvSpPr>
         <p:spPr>
           <a:xfrm>
-            <a:off x="838200" y="1825625"/>
-            <a:ext cx="10515600" cy="4667250"/>
+            <a:off x="838200" y="1455174"/>
+            <a:ext cx="10515600" cy="5037701"/>
           </a:xfrm>
         </p:spPr>
         <p:txBody>
           <a:bodyPr>
-            <a:normAutofit lnSpcReduction="10000"/>
+            <a:normAutofit/>
           </a:bodyPr>
           <a:lstStyle/>
           <a:p>
@@ -6663,15 +6925,7 @@
             <a:pPr lvl="1"/>
             <a:r>
               <a:rPr lang="en-GB" dirty="0"/>
-              <a:t>Apache server</a:t>
-            </a:r>
-            <a:r>
-              <a:rPr lang="en-GB"/>
-              <a:t>, Amazon </a:t>
-            </a:r>
-            <a:r>
-              <a:rPr lang="en-GB" dirty="0"/>
-              <a:t>web services, etc.</a:t>
+              <a:t>Apache server, Amazon web services, etc.</a:t>
             </a:r>
           </a:p>
           <a:p>

</xml_diff>